<commit_message>
Forgot to commit files on the last one.
</commit_message>
<xml_diff>
--- a/docs/Figures/SystemWorking.pptx
+++ b/docs/Figures/SystemWorking.pptx
@@ -115,7 +115,7 @@
   </p:defaultTextStyle>
   <p:extLst>
     <p:ext uri="{EFAFB233-063F-42B5-8137-9DF3F51BA10A}">
-      <p15:sldGuideLst xmlns:p15="http://schemas.microsoft.com/office/powerpoint/2012/main" xmlns="">
+      <p15:sldGuideLst xmlns:p15="http://schemas.microsoft.com/office/powerpoint/2012/main">
         <p15:guide id="1" orient="horz" pos="2160">
           <p15:clr>
             <a:srgbClr val="A4A3A4"/>
@@ -214,7 +214,7 @@
           <a:p>
             <a:fld id="{7B126BB8-5932-4ACC-8CD5-328D9DA138C9}" type="datetimeFigureOut">
               <a:rPr lang="en-US" smtClean="0"/>
-              <a:t>3/6/2017</a:t>
+              <a:t>1/22/2020</a:t>
             </a:fld>
             <a:endParaRPr lang="en-US"/>
           </a:p>
@@ -278,38 +278,37 @@
           <a:p>
             <a:pPr lvl="0"/>
             <a:r>
-              <a:rPr lang="en-US" smtClean="0"/>
+              <a:rPr lang="en-US"/>
               <a:t>Click to edit Master text styles</a:t>
             </a:r>
           </a:p>
           <a:p>
             <a:pPr lvl="1"/>
             <a:r>
-              <a:rPr lang="en-US" smtClean="0"/>
+              <a:rPr lang="en-US"/>
               <a:t>Second level</a:t>
             </a:r>
           </a:p>
           <a:p>
             <a:pPr lvl="2"/>
             <a:r>
-              <a:rPr lang="en-US" smtClean="0"/>
+              <a:rPr lang="en-US"/>
               <a:t>Third level</a:t>
             </a:r>
           </a:p>
           <a:p>
             <a:pPr lvl="3"/>
             <a:r>
-              <a:rPr lang="en-US" smtClean="0"/>
+              <a:rPr lang="en-US"/>
               <a:t>Fourth level</a:t>
             </a:r>
           </a:p>
           <a:p>
             <a:pPr lvl="4"/>
             <a:r>
-              <a:rPr lang="en-US" smtClean="0"/>
+              <a:rPr lang="en-US"/>
               <a:t>Fifth level</a:t>
             </a:r>
-            <a:endParaRPr lang="en-US"/>
           </a:p>
         </p:txBody>
       </p:sp>
@@ -520,10 +519,9 @@
           <a:lstStyle/>
           <a:p>
             <a:r>
-              <a:rPr lang="en-US" smtClean="0"/>
+              <a:rPr lang="en-US"/>
               <a:t>Click to edit Master title style</a:t>
             </a:r>
-            <a:endParaRPr lang="en-US"/>
           </a:p>
         </p:txBody>
       </p:sp>
@@ -639,10 +637,9 @@
           </a:lstStyle>
           <a:p>
             <a:r>
-              <a:rPr lang="en-US" smtClean="0"/>
+              <a:rPr lang="en-US"/>
               <a:t>Click to edit Master subtitle style</a:t>
             </a:r>
-            <a:endParaRPr lang="en-US"/>
           </a:p>
         </p:txBody>
       </p:sp>
@@ -663,7 +660,7 @@
           <a:p>
             <a:fld id="{9E9AFD63-10BD-4598-9E1E-9FFECB76D2D7}" type="datetimeFigureOut">
               <a:rPr lang="en-US" smtClean="0"/>
-              <a:t>3/6/2017</a:t>
+              <a:t>1/22/2020</a:t>
             </a:fld>
             <a:endParaRPr lang="en-US"/>
           </a:p>
@@ -757,10 +754,9 @@
           <a:lstStyle/>
           <a:p>
             <a:r>
-              <a:rPr lang="en-US" smtClean="0"/>
+              <a:rPr lang="en-US"/>
               <a:t>Click to edit Master title style</a:t>
             </a:r>
-            <a:endParaRPr lang="en-US"/>
           </a:p>
         </p:txBody>
       </p:sp>
@@ -781,38 +777,37 @@
           <a:p>
             <a:pPr lvl="0"/>
             <a:r>
-              <a:rPr lang="en-US" smtClean="0"/>
+              <a:rPr lang="en-US"/>
               <a:t>Click to edit Master text styles</a:t>
             </a:r>
           </a:p>
           <a:p>
             <a:pPr lvl="1"/>
             <a:r>
-              <a:rPr lang="en-US" smtClean="0"/>
+              <a:rPr lang="en-US"/>
               <a:t>Second level</a:t>
             </a:r>
           </a:p>
           <a:p>
             <a:pPr lvl="2"/>
             <a:r>
-              <a:rPr lang="en-US" smtClean="0"/>
+              <a:rPr lang="en-US"/>
               <a:t>Third level</a:t>
             </a:r>
           </a:p>
           <a:p>
             <a:pPr lvl="3"/>
             <a:r>
-              <a:rPr lang="en-US" smtClean="0"/>
+              <a:rPr lang="en-US"/>
               <a:t>Fourth level</a:t>
             </a:r>
           </a:p>
           <a:p>
             <a:pPr lvl="4"/>
             <a:r>
-              <a:rPr lang="en-US" smtClean="0"/>
+              <a:rPr lang="en-US"/>
               <a:t>Fifth level</a:t>
             </a:r>
-            <a:endParaRPr lang="en-US"/>
           </a:p>
         </p:txBody>
       </p:sp>
@@ -833,7 +828,7 @@
           <a:p>
             <a:fld id="{9E9AFD63-10BD-4598-9E1E-9FFECB76D2D7}" type="datetimeFigureOut">
               <a:rPr lang="en-US" smtClean="0"/>
-              <a:t>3/6/2017</a:t>
+              <a:t>1/22/2020</a:t>
             </a:fld>
             <a:endParaRPr lang="en-US"/>
           </a:p>
@@ -932,10 +927,9 @@
           <a:lstStyle/>
           <a:p>
             <a:r>
-              <a:rPr lang="en-US" smtClean="0"/>
+              <a:rPr lang="en-US"/>
               <a:t>Click to edit Master title style</a:t>
             </a:r>
-            <a:endParaRPr lang="en-US"/>
           </a:p>
         </p:txBody>
       </p:sp>
@@ -961,38 +955,37 @@
           <a:p>
             <a:pPr lvl="0"/>
             <a:r>
-              <a:rPr lang="en-US" smtClean="0"/>
+              <a:rPr lang="en-US"/>
               <a:t>Click to edit Master text styles</a:t>
             </a:r>
           </a:p>
           <a:p>
             <a:pPr lvl="1"/>
             <a:r>
-              <a:rPr lang="en-US" smtClean="0"/>
+              <a:rPr lang="en-US"/>
               <a:t>Second level</a:t>
             </a:r>
           </a:p>
           <a:p>
             <a:pPr lvl="2"/>
             <a:r>
-              <a:rPr lang="en-US" smtClean="0"/>
+              <a:rPr lang="en-US"/>
               <a:t>Third level</a:t>
             </a:r>
           </a:p>
           <a:p>
             <a:pPr lvl="3"/>
             <a:r>
-              <a:rPr lang="en-US" smtClean="0"/>
+              <a:rPr lang="en-US"/>
               <a:t>Fourth level</a:t>
             </a:r>
           </a:p>
           <a:p>
             <a:pPr lvl="4"/>
             <a:r>
-              <a:rPr lang="en-US" smtClean="0"/>
+              <a:rPr lang="en-US"/>
               <a:t>Fifth level</a:t>
             </a:r>
-            <a:endParaRPr lang="en-US"/>
           </a:p>
         </p:txBody>
       </p:sp>
@@ -1013,7 +1006,7 @@
           <a:p>
             <a:fld id="{9E9AFD63-10BD-4598-9E1E-9FFECB76D2D7}" type="datetimeFigureOut">
               <a:rPr lang="en-US" smtClean="0"/>
-              <a:t>3/6/2017</a:t>
+              <a:t>1/22/2020</a:t>
             </a:fld>
             <a:endParaRPr lang="en-US"/>
           </a:p>
@@ -1208,10 +1201,9 @@
           </a:lstStyle>
           <a:p>
             <a:r>
-              <a:rPr lang="en-US" dirty="0" smtClean="0"/>
+              <a:rPr lang="en-US" dirty="0"/>
               <a:t>date</a:t>
             </a:r>
-            <a:endParaRPr lang="en-US" dirty="0"/>
           </a:p>
         </p:txBody>
       </p:sp>
@@ -1375,10 +1367,9 @@
           </a:lstStyle>
           <a:p>
             <a:r>
-              <a:rPr lang="en-US" dirty="0" smtClean="0"/>
+              <a:rPr lang="en-US" dirty="0"/>
               <a:t>Click to edit title</a:t>
             </a:r>
-            <a:endParaRPr lang="en-US" dirty="0"/>
           </a:p>
         </p:txBody>
       </p:sp>
@@ -1467,38 +1458,37 @@
           <a:p>
             <a:pPr lvl="0"/>
             <a:r>
-              <a:rPr lang="en-US" smtClean="0"/>
+              <a:rPr lang="en-US"/>
               <a:t>Click to edit Master text styles</a:t>
             </a:r>
           </a:p>
           <a:p>
             <a:pPr lvl="1"/>
             <a:r>
-              <a:rPr lang="en-US" smtClean="0"/>
+              <a:rPr lang="en-US"/>
               <a:t>Second level</a:t>
             </a:r>
           </a:p>
           <a:p>
             <a:pPr lvl="2"/>
             <a:r>
-              <a:rPr lang="en-US" smtClean="0"/>
+              <a:rPr lang="en-US"/>
               <a:t>Third level</a:t>
             </a:r>
           </a:p>
           <a:p>
             <a:pPr lvl="3"/>
             <a:r>
-              <a:rPr lang="en-US" smtClean="0"/>
+              <a:rPr lang="en-US"/>
               <a:t>Fourth level</a:t>
             </a:r>
           </a:p>
           <a:p>
             <a:pPr lvl="4"/>
             <a:r>
-              <a:rPr lang="en-US" smtClean="0"/>
+              <a:rPr lang="en-US"/>
               <a:t>Fifth level</a:t>
             </a:r>
-            <a:endParaRPr lang="en-US"/>
           </a:p>
         </p:txBody>
       </p:sp>
@@ -1528,7 +1518,7 @@
           <a:lstStyle/>
           <a:p>
             <a:r>
-              <a:rPr lang="en-US" smtClean="0"/>
+              <a:rPr lang="en-US"/>
               <a:t>Click to edit Master title style</a:t>
             </a:r>
             <a:endParaRPr lang="en-US" dirty="0"/>
@@ -1593,7 +1583,7 @@
           </a:lstStyle>
           <a:p>
             <a:r>
-              <a:rPr lang="en-US" smtClean="0"/>
+              <a:rPr lang="en-US"/>
               <a:t>Click to edit Master title style</a:t>
             </a:r>
             <a:endParaRPr lang="en-US" dirty="0"/>
@@ -1716,7 +1706,7 @@
           <a:p>
             <a:pPr lvl="0"/>
             <a:r>
-              <a:rPr lang="en-US" smtClean="0"/>
+              <a:rPr lang="en-US"/>
               <a:t>Click to edit Master text styles</a:t>
             </a:r>
           </a:p>
@@ -1805,35 +1795,35 @@
           <a:p>
             <a:pPr lvl="0"/>
             <a:r>
-              <a:rPr lang="en-US" smtClean="0"/>
+              <a:rPr lang="en-US"/>
               <a:t>Click to edit Master text styles</a:t>
             </a:r>
           </a:p>
           <a:p>
             <a:pPr lvl="1"/>
             <a:r>
-              <a:rPr lang="en-US" smtClean="0"/>
+              <a:rPr lang="en-US"/>
               <a:t>Second level</a:t>
             </a:r>
           </a:p>
           <a:p>
             <a:pPr lvl="2"/>
             <a:r>
-              <a:rPr lang="en-US" smtClean="0"/>
+              <a:rPr lang="en-US"/>
               <a:t>Third level</a:t>
             </a:r>
           </a:p>
           <a:p>
             <a:pPr lvl="3"/>
             <a:r>
-              <a:rPr lang="en-US" smtClean="0"/>
+              <a:rPr lang="en-US"/>
               <a:t>Fourth level</a:t>
             </a:r>
           </a:p>
           <a:p>
             <a:pPr lvl="4"/>
             <a:r>
-              <a:rPr lang="en-US" smtClean="0"/>
+              <a:rPr lang="en-US"/>
               <a:t>Fifth level</a:t>
             </a:r>
             <a:endParaRPr lang="en-US" dirty="0"/>
@@ -1893,38 +1883,37 @@
           <a:p>
             <a:pPr lvl="0"/>
             <a:r>
-              <a:rPr lang="en-US" smtClean="0"/>
+              <a:rPr lang="en-US"/>
               <a:t>Click to edit Master text styles</a:t>
             </a:r>
           </a:p>
           <a:p>
             <a:pPr lvl="1"/>
             <a:r>
-              <a:rPr lang="en-US" smtClean="0"/>
+              <a:rPr lang="en-US"/>
               <a:t>Second level</a:t>
             </a:r>
           </a:p>
           <a:p>
             <a:pPr lvl="2"/>
             <a:r>
-              <a:rPr lang="en-US" smtClean="0"/>
+              <a:rPr lang="en-US"/>
               <a:t>Third level</a:t>
             </a:r>
           </a:p>
           <a:p>
             <a:pPr lvl="3"/>
             <a:r>
-              <a:rPr lang="en-US" smtClean="0"/>
+              <a:rPr lang="en-US"/>
               <a:t>Fourth level</a:t>
             </a:r>
           </a:p>
           <a:p>
             <a:pPr lvl="4"/>
             <a:r>
-              <a:rPr lang="en-US" smtClean="0"/>
+              <a:rPr lang="en-US"/>
               <a:t>Fifth level</a:t>
             </a:r>
-            <a:endParaRPr lang="en-US"/>
           </a:p>
         </p:txBody>
       </p:sp>
@@ -1954,7 +1943,7 @@
           <a:lstStyle/>
           <a:p>
             <a:r>
-              <a:rPr lang="en-US" smtClean="0"/>
+              <a:rPr lang="en-US"/>
               <a:t>Click to edit Master title style</a:t>
             </a:r>
             <a:endParaRPr lang="en-US" dirty="0"/>
@@ -2055,7 +2044,7 @@
           <a:p>
             <a:pPr lvl="0"/>
             <a:r>
-              <a:rPr lang="en-US" smtClean="0"/>
+              <a:rPr lang="en-US"/>
               <a:t>Click to edit Master text styles</a:t>
             </a:r>
           </a:p>
@@ -2114,35 +2103,35 @@
           <a:p>
             <a:pPr lvl="0"/>
             <a:r>
-              <a:rPr lang="en-US" smtClean="0"/>
+              <a:rPr lang="en-US"/>
               <a:t>Click to edit Master text styles</a:t>
             </a:r>
           </a:p>
           <a:p>
             <a:pPr lvl="1"/>
             <a:r>
-              <a:rPr lang="en-US" smtClean="0"/>
+              <a:rPr lang="en-US"/>
               <a:t>Second level</a:t>
             </a:r>
           </a:p>
           <a:p>
             <a:pPr lvl="2"/>
             <a:r>
-              <a:rPr lang="en-US" smtClean="0"/>
+              <a:rPr lang="en-US"/>
               <a:t>Third level</a:t>
             </a:r>
           </a:p>
           <a:p>
             <a:pPr lvl="3"/>
             <a:r>
-              <a:rPr lang="en-US" smtClean="0"/>
+              <a:rPr lang="en-US"/>
               <a:t>Fourth level</a:t>
             </a:r>
           </a:p>
           <a:p>
             <a:pPr lvl="4"/>
             <a:r>
-              <a:rPr lang="en-US" smtClean="0"/>
+              <a:rPr lang="en-US"/>
               <a:t>Fifth level</a:t>
             </a:r>
             <a:endParaRPr lang="en-US" dirty="0"/>
@@ -2213,7 +2202,7 @@
           <a:p>
             <a:pPr lvl="0"/>
             <a:r>
-              <a:rPr lang="en-US" smtClean="0"/>
+              <a:rPr lang="en-US"/>
               <a:t>Click to edit Master text styles</a:t>
             </a:r>
           </a:p>
@@ -2272,38 +2261,37 @@
           <a:p>
             <a:pPr lvl="0"/>
             <a:r>
-              <a:rPr lang="en-US" smtClean="0"/>
+              <a:rPr lang="en-US"/>
               <a:t>Click to edit Master text styles</a:t>
             </a:r>
           </a:p>
           <a:p>
             <a:pPr lvl="1"/>
             <a:r>
-              <a:rPr lang="en-US" smtClean="0"/>
+              <a:rPr lang="en-US"/>
               <a:t>Second level</a:t>
             </a:r>
           </a:p>
           <a:p>
             <a:pPr lvl="2"/>
             <a:r>
-              <a:rPr lang="en-US" smtClean="0"/>
+              <a:rPr lang="en-US"/>
               <a:t>Third level</a:t>
             </a:r>
           </a:p>
           <a:p>
             <a:pPr lvl="3"/>
             <a:r>
-              <a:rPr lang="en-US" smtClean="0"/>
+              <a:rPr lang="en-US"/>
               <a:t>Fourth level</a:t>
             </a:r>
           </a:p>
           <a:p>
             <a:pPr lvl="4"/>
             <a:r>
-              <a:rPr lang="en-US" smtClean="0"/>
+              <a:rPr lang="en-US"/>
               <a:t>Fifth level</a:t>
             </a:r>
-            <a:endParaRPr lang="en-US"/>
           </a:p>
         </p:txBody>
       </p:sp>
@@ -2333,7 +2321,7 @@
           <a:lstStyle/>
           <a:p>
             <a:r>
-              <a:rPr lang="en-US" smtClean="0"/>
+              <a:rPr lang="en-US"/>
               <a:t>Click to edit Master title style</a:t>
             </a:r>
             <a:endParaRPr lang="en-US" dirty="0"/>
@@ -2396,7 +2384,7 @@
           <a:lstStyle/>
           <a:p>
             <a:r>
-              <a:rPr lang="en-US" smtClean="0"/>
+              <a:rPr lang="en-US"/>
               <a:t>Click to edit Master title style</a:t>
             </a:r>
             <a:endParaRPr lang="en-US" dirty="0"/>
@@ -2491,10 +2479,9 @@
           </a:lstStyle>
           <a:p>
             <a:r>
-              <a:rPr lang="en-US" smtClean="0"/>
+              <a:rPr lang="en-US"/>
               <a:t>Click to edit Master title style</a:t>
             </a:r>
-            <a:endParaRPr lang="en-US"/>
           </a:p>
         </p:txBody>
       </p:sp>
@@ -2551,35 +2538,35 @@
           <a:p>
             <a:pPr lvl="0"/>
             <a:r>
-              <a:rPr lang="en-US" smtClean="0"/>
+              <a:rPr lang="en-US"/>
               <a:t>Click to edit Master text styles</a:t>
             </a:r>
           </a:p>
           <a:p>
             <a:pPr lvl="1"/>
             <a:r>
-              <a:rPr lang="en-US" smtClean="0"/>
+              <a:rPr lang="en-US"/>
               <a:t>Second level</a:t>
             </a:r>
           </a:p>
           <a:p>
             <a:pPr lvl="2"/>
             <a:r>
-              <a:rPr lang="en-US" smtClean="0"/>
+              <a:rPr lang="en-US"/>
               <a:t>Third level</a:t>
             </a:r>
           </a:p>
           <a:p>
             <a:pPr lvl="3"/>
             <a:r>
-              <a:rPr lang="en-US" smtClean="0"/>
+              <a:rPr lang="en-US"/>
               <a:t>Fourth level</a:t>
             </a:r>
           </a:p>
           <a:p>
             <a:pPr lvl="4"/>
             <a:r>
-              <a:rPr lang="en-US" smtClean="0"/>
+              <a:rPr lang="en-US"/>
               <a:t>Fifth level</a:t>
             </a:r>
             <a:endParaRPr lang="en-US" dirty="0"/>
@@ -2648,7 +2635,7 @@
           <a:p>
             <a:pPr lvl="0"/>
             <a:r>
-              <a:rPr lang="en-US" smtClean="0"/>
+              <a:rPr lang="en-US"/>
               <a:t>Click to edit Master text styles</a:t>
             </a:r>
           </a:p>
@@ -2700,10 +2687,9 @@
           <a:lstStyle/>
           <a:p>
             <a:r>
-              <a:rPr lang="en-US" smtClean="0"/>
+              <a:rPr lang="en-US"/>
               <a:t>Click to edit Master title style</a:t>
             </a:r>
-            <a:endParaRPr lang="en-US"/>
           </a:p>
         </p:txBody>
       </p:sp>
@@ -2724,38 +2710,37 @@
           <a:p>
             <a:pPr lvl="0"/>
             <a:r>
-              <a:rPr lang="en-US" smtClean="0"/>
+              <a:rPr lang="en-US"/>
               <a:t>Click to edit Master text styles</a:t>
             </a:r>
           </a:p>
           <a:p>
             <a:pPr lvl="1"/>
             <a:r>
-              <a:rPr lang="en-US" smtClean="0"/>
+              <a:rPr lang="en-US"/>
               <a:t>Second level</a:t>
             </a:r>
           </a:p>
           <a:p>
             <a:pPr lvl="2"/>
             <a:r>
-              <a:rPr lang="en-US" smtClean="0"/>
+              <a:rPr lang="en-US"/>
               <a:t>Third level</a:t>
             </a:r>
           </a:p>
           <a:p>
             <a:pPr lvl="3"/>
             <a:r>
-              <a:rPr lang="en-US" smtClean="0"/>
+              <a:rPr lang="en-US"/>
               <a:t>Fourth level</a:t>
             </a:r>
           </a:p>
           <a:p>
             <a:pPr lvl="4"/>
             <a:r>
-              <a:rPr lang="en-US" smtClean="0"/>
+              <a:rPr lang="en-US"/>
               <a:t>Fifth level</a:t>
             </a:r>
-            <a:endParaRPr lang="en-US"/>
           </a:p>
         </p:txBody>
       </p:sp>
@@ -2776,7 +2761,7 @@
           <a:p>
             <a:fld id="{9E9AFD63-10BD-4598-9E1E-9FFECB76D2D7}" type="datetimeFigureOut">
               <a:rPr lang="en-US" smtClean="0"/>
-              <a:t>3/6/2017</a:t>
+              <a:t>1/22/2020</a:t>
             </a:fld>
             <a:endParaRPr lang="en-US"/>
           </a:p>
@@ -2882,10 +2867,9 @@
           </a:lstStyle>
           <a:p>
             <a:r>
-              <a:rPr lang="en-US" smtClean="0"/>
+              <a:rPr lang="en-US"/>
               <a:t>Click to edit Master title style</a:t>
             </a:r>
-            <a:endParaRPr lang="en-US"/>
           </a:p>
         </p:txBody>
       </p:sp>
@@ -2950,10 +2934,9 @@
           </a:lstStyle>
           <a:p>
             <a:r>
-              <a:rPr lang="en-US" smtClean="0"/>
+              <a:rPr lang="en-US"/>
               <a:t>Drag picture to placeholder or click icon to add</a:t>
             </a:r>
-            <a:endParaRPr lang="en-US"/>
           </a:p>
         </p:txBody>
       </p:sp>
@@ -3019,7 +3002,7 @@
           <a:p>
             <a:pPr lvl="0"/>
             <a:r>
-              <a:rPr lang="en-US" smtClean="0"/>
+              <a:rPr lang="en-US"/>
               <a:t>Click to edit Master text styles</a:t>
             </a:r>
           </a:p>
@@ -3080,10 +3063,9 @@
           </a:lstStyle>
           <a:p>
             <a:r>
-              <a:rPr lang="en-US" smtClean="0"/>
+              <a:rPr lang="en-US"/>
               <a:t>Click to edit Master title style</a:t>
             </a:r>
-            <a:endParaRPr lang="en-US"/>
           </a:p>
         </p:txBody>
       </p:sp>
@@ -3200,7 +3182,7 @@
           <a:p>
             <a:pPr lvl="0"/>
             <a:r>
-              <a:rPr lang="en-US" smtClean="0"/>
+              <a:rPr lang="en-US"/>
               <a:t>Click to edit Master text styles</a:t>
             </a:r>
           </a:p>
@@ -3223,7 +3205,7 @@
           <a:p>
             <a:fld id="{9E9AFD63-10BD-4598-9E1E-9FFECB76D2D7}" type="datetimeFigureOut">
               <a:rPr lang="en-US" smtClean="0"/>
-              <a:t>3/6/2017</a:t>
+              <a:t>1/22/2020</a:t>
             </a:fld>
             <a:endParaRPr lang="en-US"/>
           </a:p>
@@ -3317,10 +3299,9 @@
           <a:lstStyle/>
           <a:p>
             <a:r>
-              <a:rPr lang="en-US" smtClean="0"/>
+              <a:rPr lang="en-US"/>
               <a:t>Click to edit Master title style</a:t>
             </a:r>
-            <a:endParaRPr lang="en-US"/>
           </a:p>
         </p:txBody>
       </p:sp>
@@ -3374,38 +3355,37 @@
           <a:p>
             <a:pPr lvl="0"/>
             <a:r>
-              <a:rPr lang="en-US" smtClean="0"/>
+              <a:rPr lang="en-US"/>
               <a:t>Click to edit Master text styles</a:t>
             </a:r>
           </a:p>
           <a:p>
             <a:pPr lvl="1"/>
             <a:r>
-              <a:rPr lang="en-US" smtClean="0"/>
+              <a:rPr lang="en-US"/>
               <a:t>Second level</a:t>
             </a:r>
           </a:p>
           <a:p>
             <a:pPr lvl="2"/>
             <a:r>
-              <a:rPr lang="en-US" smtClean="0"/>
+              <a:rPr lang="en-US"/>
               <a:t>Third level</a:t>
             </a:r>
           </a:p>
           <a:p>
             <a:pPr lvl="3"/>
             <a:r>
-              <a:rPr lang="en-US" smtClean="0"/>
+              <a:rPr lang="en-US"/>
               <a:t>Fourth level</a:t>
             </a:r>
           </a:p>
           <a:p>
             <a:pPr lvl="4"/>
             <a:r>
-              <a:rPr lang="en-US" smtClean="0"/>
+              <a:rPr lang="en-US"/>
               <a:t>Fifth level</a:t>
             </a:r>
-            <a:endParaRPr lang="en-US"/>
           </a:p>
         </p:txBody>
       </p:sp>
@@ -3459,38 +3439,37 @@
           <a:p>
             <a:pPr lvl="0"/>
             <a:r>
-              <a:rPr lang="en-US" smtClean="0"/>
+              <a:rPr lang="en-US"/>
               <a:t>Click to edit Master text styles</a:t>
             </a:r>
           </a:p>
           <a:p>
             <a:pPr lvl="1"/>
             <a:r>
-              <a:rPr lang="en-US" smtClean="0"/>
+              <a:rPr lang="en-US"/>
               <a:t>Second level</a:t>
             </a:r>
           </a:p>
           <a:p>
             <a:pPr lvl="2"/>
             <a:r>
-              <a:rPr lang="en-US" smtClean="0"/>
+              <a:rPr lang="en-US"/>
               <a:t>Third level</a:t>
             </a:r>
           </a:p>
           <a:p>
             <a:pPr lvl="3"/>
             <a:r>
-              <a:rPr lang="en-US" smtClean="0"/>
+              <a:rPr lang="en-US"/>
               <a:t>Fourth level</a:t>
             </a:r>
           </a:p>
           <a:p>
             <a:pPr lvl="4"/>
             <a:r>
-              <a:rPr lang="en-US" smtClean="0"/>
+              <a:rPr lang="en-US"/>
               <a:t>Fifth level</a:t>
             </a:r>
-            <a:endParaRPr lang="en-US"/>
           </a:p>
         </p:txBody>
       </p:sp>
@@ -3511,7 +3490,7 @@
           <a:p>
             <a:fld id="{9E9AFD63-10BD-4598-9E1E-9FFECB76D2D7}" type="datetimeFigureOut">
               <a:rPr lang="en-US" smtClean="0"/>
-              <a:t>3/6/2017</a:t>
+              <a:t>1/22/2020</a:t>
             </a:fld>
             <a:endParaRPr lang="en-US"/>
           </a:p>
@@ -3609,10 +3588,9 @@
           </a:lstStyle>
           <a:p>
             <a:r>
-              <a:rPr lang="en-US" smtClean="0"/>
+              <a:rPr lang="en-US"/>
               <a:t>Click to edit Master title style</a:t>
             </a:r>
-            <a:endParaRPr lang="en-US"/>
           </a:p>
         </p:txBody>
       </p:sp>
@@ -3675,7 +3653,7 @@
           <a:p>
             <a:pPr lvl="0"/>
             <a:r>
-              <a:rPr lang="en-US" smtClean="0"/>
+              <a:rPr lang="en-US"/>
               <a:t>Click to edit Master text styles</a:t>
             </a:r>
           </a:p>
@@ -3731,38 +3709,37 @@
           <a:p>
             <a:pPr lvl="0"/>
             <a:r>
-              <a:rPr lang="en-US" smtClean="0"/>
+              <a:rPr lang="en-US"/>
               <a:t>Click to edit Master text styles</a:t>
             </a:r>
           </a:p>
           <a:p>
             <a:pPr lvl="1"/>
             <a:r>
-              <a:rPr lang="en-US" smtClean="0"/>
+              <a:rPr lang="en-US"/>
               <a:t>Second level</a:t>
             </a:r>
           </a:p>
           <a:p>
             <a:pPr lvl="2"/>
             <a:r>
-              <a:rPr lang="en-US" smtClean="0"/>
+              <a:rPr lang="en-US"/>
               <a:t>Third level</a:t>
             </a:r>
           </a:p>
           <a:p>
             <a:pPr lvl="3"/>
             <a:r>
-              <a:rPr lang="en-US" smtClean="0"/>
+              <a:rPr lang="en-US"/>
               <a:t>Fourth level</a:t>
             </a:r>
           </a:p>
           <a:p>
             <a:pPr lvl="4"/>
             <a:r>
-              <a:rPr lang="en-US" smtClean="0"/>
+              <a:rPr lang="en-US"/>
               <a:t>Fifth level</a:t>
             </a:r>
-            <a:endParaRPr lang="en-US"/>
           </a:p>
         </p:txBody>
       </p:sp>
@@ -3825,7 +3802,7 @@
           <a:p>
             <a:pPr lvl="0"/>
             <a:r>
-              <a:rPr lang="en-US" smtClean="0"/>
+              <a:rPr lang="en-US"/>
               <a:t>Click to edit Master text styles</a:t>
             </a:r>
           </a:p>
@@ -3881,38 +3858,37 @@
           <a:p>
             <a:pPr lvl="0"/>
             <a:r>
-              <a:rPr lang="en-US" smtClean="0"/>
+              <a:rPr lang="en-US"/>
               <a:t>Click to edit Master text styles</a:t>
             </a:r>
           </a:p>
           <a:p>
             <a:pPr lvl="1"/>
             <a:r>
-              <a:rPr lang="en-US" smtClean="0"/>
+              <a:rPr lang="en-US"/>
               <a:t>Second level</a:t>
             </a:r>
           </a:p>
           <a:p>
             <a:pPr lvl="2"/>
             <a:r>
-              <a:rPr lang="en-US" smtClean="0"/>
+              <a:rPr lang="en-US"/>
               <a:t>Third level</a:t>
             </a:r>
           </a:p>
           <a:p>
             <a:pPr lvl="3"/>
             <a:r>
-              <a:rPr lang="en-US" smtClean="0"/>
+              <a:rPr lang="en-US"/>
               <a:t>Fourth level</a:t>
             </a:r>
           </a:p>
           <a:p>
             <a:pPr lvl="4"/>
             <a:r>
-              <a:rPr lang="en-US" smtClean="0"/>
+              <a:rPr lang="en-US"/>
               <a:t>Fifth level</a:t>
             </a:r>
-            <a:endParaRPr lang="en-US"/>
           </a:p>
         </p:txBody>
       </p:sp>
@@ -3933,7 +3909,7 @@
           <a:p>
             <a:fld id="{9E9AFD63-10BD-4598-9E1E-9FFECB76D2D7}" type="datetimeFigureOut">
               <a:rPr lang="en-US" smtClean="0"/>
-              <a:t>3/6/2017</a:t>
+              <a:t>1/22/2020</a:t>
             </a:fld>
             <a:endParaRPr lang="en-US"/>
           </a:p>
@@ -4027,10 +4003,9 @@
           <a:lstStyle/>
           <a:p>
             <a:r>
-              <a:rPr lang="en-US" smtClean="0"/>
+              <a:rPr lang="en-US"/>
               <a:t>Click to edit Master title style</a:t>
             </a:r>
-            <a:endParaRPr lang="en-US"/>
           </a:p>
         </p:txBody>
       </p:sp>
@@ -4051,7 +4026,7 @@
           <a:p>
             <a:fld id="{9E9AFD63-10BD-4598-9E1E-9FFECB76D2D7}" type="datetimeFigureOut">
               <a:rPr lang="en-US" smtClean="0"/>
-              <a:t>3/6/2017</a:t>
+              <a:t>1/22/2020</a:t>
             </a:fld>
             <a:endParaRPr lang="en-US"/>
           </a:p>
@@ -4146,7 +4121,7 @@
           <a:p>
             <a:fld id="{9E9AFD63-10BD-4598-9E1E-9FFECB76D2D7}" type="datetimeFigureOut">
               <a:rPr lang="en-US" smtClean="0"/>
-              <a:t>3/6/2017</a:t>
+              <a:t>1/22/2020</a:t>
             </a:fld>
             <a:endParaRPr lang="en-US"/>
           </a:p>
@@ -4249,10 +4224,9 @@
           </a:lstStyle>
           <a:p>
             <a:r>
-              <a:rPr lang="en-US" smtClean="0"/>
+              <a:rPr lang="en-US"/>
               <a:t>Click to edit Master title style</a:t>
             </a:r>
-            <a:endParaRPr lang="en-US"/>
           </a:p>
         </p:txBody>
       </p:sp>
@@ -4306,38 +4280,37 @@
           <a:p>
             <a:pPr lvl="0"/>
             <a:r>
-              <a:rPr lang="en-US" smtClean="0"/>
+              <a:rPr lang="en-US"/>
               <a:t>Click to edit Master text styles</a:t>
             </a:r>
           </a:p>
           <a:p>
             <a:pPr lvl="1"/>
             <a:r>
-              <a:rPr lang="en-US" smtClean="0"/>
+              <a:rPr lang="en-US"/>
               <a:t>Second level</a:t>
             </a:r>
           </a:p>
           <a:p>
             <a:pPr lvl="2"/>
             <a:r>
-              <a:rPr lang="en-US" smtClean="0"/>
+              <a:rPr lang="en-US"/>
               <a:t>Third level</a:t>
             </a:r>
           </a:p>
           <a:p>
             <a:pPr lvl="3"/>
             <a:r>
-              <a:rPr lang="en-US" smtClean="0"/>
+              <a:rPr lang="en-US"/>
               <a:t>Fourth level</a:t>
             </a:r>
           </a:p>
           <a:p>
             <a:pPr lvl="4"/>
             <a:r>
-              <a:rPr lang="en-US" smtClean="0"/>
+              <a:rPr lang="en-US"/>
               <a:t>Fifth level</a:t>
             </a:r>
-            <a:endParaRPr lang="en-US"/>
           </a:p>
         </p:txBody>
       </p:sp>
@@ -4400,7 +4373,7 @@
           <a:p>
             <a:pPr lvl="0"/>
             <a:r>
-              <a:rPr lang="en-US" smtClean="0"/>
+              <a:rPr lang="en-US"/>
               <a:t>Click to edit Master text styles</a:t>
             </a:r>
           </a:p>
@@ -4423,7 +4396,7 @@
           <a:p>
             <a:fld id="{9E9AFD63-10BD-4598-9E1E-9FFECB76D2D7}" type="datetimeFigureOut">
               <a:rPr lang="en-US" smtClean="0"/>
-              <a:t>3/6/2017</a:t>
+              <a:t>1/22/2020</a:t>
             </a:fld>
             <a:endParaRPr lang="en-US"/>
           </a:p>
@@ -4526,10 +4499,9 @@
           </a:lstStyle>
           <a:p>
             <a:r>
-              <a:rPr lang="en-US" smtClean="0"/>
+              <a:rPr lang="en-US"/>
               <a:t>Click to edit Master title style</a:t>
             </a:r>
-            <a:endParaRPr lang="en-US"/>
           </a:p>
         </p:txBody>
       </p:sp>
@@ -4653,7 +4625,7 @@
           <a:p>
             <a:pPr lvl="0"/>
             <a:r>
-              <a:rPr lang="en-US" smtClean="0"/>
+              <a:rPr lang="en-US"/>
               <a:t>Click to edit Master text styles</a:t>
             </a:r>
           </a:p>
@@ -4676,7 +4648,7 @@
           <a:p>
             <a:fld id="{9E9AFD63-10BD-4598-9E1E-9FFECB76D2D7}" type="datetimeFigureOut">
               <a:rPr lang="en-US" smtClean="0"/>
-              <a:t>3/6/2017</a:t>
+              <a:t>1/22/2020</a:t>
             </a:fld>
             <a:endParaRPr lang="en-US"/>
           </a:p>
@@ -4785,10 +4757,9 @@
           <a:lstStyle/>
           <a:p>
             <a:r>
-              <a:rPr lang="en-US" smtClean="0"/>
+              <a:rPr lang="en-US"/>
               <a:t>Click to edit Master title style</a:t>
             </a:r>
-            <a:endParaRPr lang="en-US"/>
           </a:p>
         </p:txBody>
       </p:sp>
@@ -4819,38 +4790,37 @@
           <a:p>
             <a:pPr lvl="0"/>
             <a:r>
-              <a:rPr lang="en-US" smtClean="0"/>
+              <a:rPr lang="en-US"/>
               <a:t>Click to edit Master text styles</a:t>
             </a:r>
           </a:p>
           <a:p>
             <a:pPr lvl="1"/>
             <a:r>
-              <a:rPr lang="en-US" smtClean="0"/>
+              <a:rPr lang="en-US"/>
               <a:t>Second level</a:t>
             </a:r>
           </a:p>
           <a:p>
             <a:pPr lvl="2"/>
             <a:r>
-              <a:rPr lang="en-US" smtClean="0"/>
+              <a:rPr lang="en-US"/>
               <a:t>Third level</a:t>
             </a:r>
           </a:p>
           <a:p>
             <a:pPr lvl="3"/>
             <a:r>
-              <a:rPr lang="en-US" smtClean="0"/>
+              <a:rPr lang="en-US"/>
               <a:t>Fourth level</a:t>
             </a:r>
           </a:p>
           <a:p>
             <a:pPr lvl="4"/>
             <a:r>
-              <a:rPr lang="en-US" smtClean="0"/>
+              <a:rPr lang="en-US"/>
               <a:t>Fifth level</a:t>
             </a:r>
-            <a:endParaRPr lang="en-US"/>
           </a:p>
         </p:txBody>
       </p:sp>
@@ -4889,7 +4859,7 @@
           <a:p>
             <a:fld id="{9E9AFD63-10BD-4598-9E1E-9FFECB76D2D7}" type="datetimeFigureOut">
               <a:rPr lang="en-US" smtClean="0"/>
-              <a:t>3/6/2017</a:t>
+              <a:t>1/22/2020</a:t>
             </a:fld>
             <a:endParaRPr lang="en-US"/>
           </a:p>
@@ -5385,10 +5355,10 @@
                 <a:ea typeface="ＭＳ Ｐゴシック" pitchFamily="-106" charset="-128"/>
                 <a:cs typeface="ＭＳ Ｐゴシック" pitchFamily="-106" charset="-128"/>
               </a:rPr>
-              <a:t>Copyright </a:t>
-            </a:r>
-            <a:r>
-              <a:rPr lang="en-US" sz="600" dirty="0" smtClean="0">
+              <a:t>Copyright 2014. All rights reserved. Applied </a:t>
+            </a:r>
+            <a:r>
+              <a:rPr lang="en-US" sz="600" dirty="0" err="1">
                 <a:solidFill>
                   <a:prstClr val="black">
                     <a:lumMod val="65000"/>
@@ -5400,7 +5370,7 @@
                 <a:ea typeface="ＭＳ Ｐゴシック" pitchFamily="-106" charset="-128"/>
                 <a:cs typeface="ＭＳ Ｐゴシック" pitchFamily="-106" charset="-128"/>
               </a:rPr>
-              <a:t>2014. </a:t>
+              <a:t>ReArch</a:t>
             </a:r>
             <a:r>
               <a:rPr lang="en-US" sz="600" dirty="0">
@@ -5415,52 +5385,7 @@
                 <a:ea typeface="ＭＳ Ｐゴシック" pitchFamily="-106" charset="-128"/>
                 <a:cs typeface="ＭＳ Ｐゴシック" pitchFamily="-106" charset="-128"/>
               </a:rPr>
-              <a:t>All rights reserved. Applied </a:t>
-            </a:r>
-            <a:r>
-              <a:rPr lang="en-US" sz="600" dirty="0" err="1" smtClean="0">
-                <a:solidFill>
-                  <a:prstClr val="black">
-                    <a:lumMod val="65000"/>
-                    <a:lumOff val="35000"/>
-                    <a:alpha val="30000"/>
-                  </a:prstClr>
-                </a:solidFill>
-                <a:latin typeface="Arial" pitchFamily="-108" charset="0"/>
-                <a:ea typeface="ＭＳ Ｐゴシック" pitchFamily="-106" charset="-128"/>
-                <a:cs typeface="ＭＳ Ｐゴシック" pitchFamily="-106" charset="-128"/>
-              </a:rPr>
-              <a:t>ReArch</a:t>
-            </a:r>
-            <a:r>
-              <a:rPr lang="en-US" sz="600" dirty="0" smtClean="0">
-                <a:solidFill>
-                  <a:prstClr val="black">
-                    <a:lumMod val="65000"/>
-                    <a:lumOff val="35000"/>
-                    <a:alpha val="30000"/>
-                  </a:prstClr>
-                </a:solidFill>
-                <a:latin typeface="Arial" pitchFamily="-108" charset="0"/>
-                <a:ea typeface="ＭＳ Ｐゴシック" pitchFamily="-106" charset="-128"/>
-                <a:cs typeface="ＭＳ Ｐゴシック" pitchFamily="-106" charset="-128"/>
-              </a:rPr>
-              <a:t> </a:t>
-            </a:r>
-            <a:r>
-              <a:rPr lang="en-US" sz="600" dirty="0">
-                <a:solidFill>
-                  <a:prstClr val="black">
-                    <a:lumMod val="65000"/>
-                    <a:lumOff val="35000"/>
-                    <a:alpha val="30000"/>
-                  </a:prstClr>
-                </a:solidFill>
-                <a:latin typeface="Arial" pitchFamily="-108" charset="0"/>
-                <a:ea typeface="ＭＳ Ｐゴシック" pitchFamily="-106" charset="-128"/>
-                <a:cs typeface="ＭＳ Ｐゴシック" pitchFamily="-106" charset="-128"/>
-              </a:rPr>
-              <a:t>Associates, Inc.</a:t>
+              <a:t> Associates, Inc.</a:t>
             </a:r>
           </a:p>
         </p:txBody>
@@ -5543,35 +5468,35 @@
           <a:p>
             <a:pPr lvl="0"/>
             <a:r>
-              <a:rPr lang="en-US" smtClean="0"/>
+              <a:rPr lang="en-US"/>
               <a:t>Click to edit Master text styles</a:t>
             </a:r>
           </a:p>
           <a:p>
             <a:pPr lvl="1"/>
             <a:r>
-              <a:rPr lang="en-US" smtClean="0"/>
+              <a:rPr lang="en-US"/>
               <a:t>Second level</a:t>
             </a:r>
           </a:p>
           <a:p>
             <a:pPr lvl="2"/>
             <a:r>
-              <a:rPr lang="en-US" smtClean="0"/>
+              <a:rPr lang="en-US"/>
               <a:t>Third level</a:t>
             </a:r>
           </a:p>
           <a:p>
             <a:pPr lvl="3"/>
             <a:r>
-              <a:rPr lang="en-US" smtClean="0"/>
+              <a:rPr lang="en-US"/>
               <a:t>Fourth level</a:t>
             </a:r>
           </a:p>
           <a:p>
             <a:pPr lvl="4"/>
             <a:r>
-              <a:rPr lang="en-US" smtClean="0"/>
+              <a:rPr lang="en-US"/>
               <a:t>Fifth level</a:t>
             </a:r>
             <a:endParaRPr lang="en-US" dirty="0"/>
@@ -5604,7 +5529,7 @@
           <a:lstStyle/>
           <a:p>
             <a:r>
-              <a:rPr lang="en-US" smtClean="0"/>
+              <a:rPr lang="en-US"/>
               <a:t>Click to edit Master title style</a:t>
             </a:r>
             <a:endParaRPr lang="en-US" dirty="0"/>
@@ -6334,10 +6259,9 @@
           <a:lstStyle/>
           <a:p>
             <a:r>
-              <a:rPr lang="en-US" sz="1400" dirty="0" smtClean="0"/>
+              <a:rPr lang="en-US" sz="1400" dirty="0"/>
               <a:t>Initial</a:t>
             </a:r>
-            <a:endParaRPr lang="en-US" sz="1400" dirty="0"/>
           </a:p>
         </p:txBody>
       </p:sp>
@@ -6364,10 +6288,9 @@
           <a:lstStyle/>
           <a:p>
             <a:r>
-              <a:rPr lang="en-US" sz="1400" dirty="0" smtClean="0"/>
+              <a:rPr lang="en-US" sz="1400" dirty="0"/>
               <a:t>Secondary</a:t>
             </a:r>
-            <a:endParaRPr lang="en-US" sz="1400" dirty="0"/>
           </a:p>
         </p:txBody>
       </p:sp>
@@ -6394,10 +6317,9 @@
           <a:lstStyle/>
           <a:p>
             <a:r>
-              <a:rPr lang="en-US" sz="1400" dirty="0" smtClean="0"/>
+              <a:rPr lang="en-US" sz="1400" dirty="0"/>
               <a:t>Active</a:t>
             </a:r>
-            <a:endParaRPr lang="en-US" sz="1400" dirty="0"/>
           </a:p>
         </p:txBody>
       </p:sp>
@@ -6426,8 +6348,20 @@
                 <a:tableStyleId>{5940675A-B579-460E-94D1-54222C63F5DA}</a:tableStyleId>
               </a:tblPr>
               <a:tblGrid>
-                <a:gridCol w="1122128"/>
-                <a:gridCol w="4474001"/>
+                <a:gridCol w="1122128">
+                  <a:extLst>
+                    <a:ext uri="{9D8B030D-6E8A-4147-A177-3AD203B41FA5}">
+                      <a16:colId xmlns:a16="http://schemas.microsoft.com/office/drawing/2014/main" val="20000"/>
+                    </a:ext>
+                  </a:extLst>
+                </a:gridCol>
+                <a:gridCol w="4474001">
+                  <a:extLst>
+                    <a:ext uri="{9D8B030D-6E8A-4147-A177-3AD203B41FA5}">
+                      <a16:colId xmlns:a16="http://schemas.microsoft.com/office/drawing/2014/main" val="20001"/>
+                    </a:ext>
+                  </a:extLst>
+                </a:gridCol>
               </a:tblGrid>
               <a:tr h="370840">
                 <a:tc>
@@ -6437,10 +6371,9 @@
                     <a:p>
                       <a:pPr algn="ctr"/>
                       <a:r>
-                        <a:rPr lang="en-US" sz="1200" b="1" dirty="0" smtClean="0"/>
+                        <a:rPr lang="en-US" sz="1200" b="1" dirty="0"/>
                         <a:t>Initial</a:t>
                       </a:r>
-                      <a:endParaRPr lang="en-US" sz="1200" b="1" dirty="0" smtClean="0"/>
                     </a:p>
                   </a:txBody>
                   <a:tcPr anchor="ctr"/>
@@ -6451,30 +6384,23 @@
                     <a:lstStyle/>
                     <a:p>
                       <a:r>
-                        <a:rPr lang="en-US" sz="1200" dirty="0" smtClean="0"/>
+                        <a:rPr lang="en-US" sz="1200" dirty="0"/>
                         <a:t>All values are initialized prior to beginning</a:t>
                       </a:r>
                       <a:r>
-                        <a:rPr lang="en-US" sz="1200" baseline="0" dirty="0" smtClean="0"/>
-                        <a:t> calculations, </a:t>
-                      </a:r>
-                      <a:r>
-                        <a:rPr lang="en-US" sz="1200" baseline="0" dirty="0" smtClean="0"/>
-                        <a:t>system </a:t>
-                      </a:r>
-                      <a:r>
-                        <a:rPr lang="en-US" sz="1200" baseline="0" dirty="0" smtClean="0"/>
-                        <a:t>parameters are modified to meet the patient file values. The engine executes until all specified stabilization criteria are satisfied</a:t>
-                      </a:r>
-                      <a:r>
-                        <a:rPr lang="en-US" sz="1200" baseline="0" dirty="0" smtClean="0"/>
-                        <a:t>. The result is the patient’s resting homeostatic state.</a:t>
+                        <a:rPr lang="en-US" sz="1200" baseline="0" dirty="0"/>
+                        <a:t> calculations, system parameters are modified to meet the patient file values. The engine executes until all specified stabilization criteria are satisfied. The result is the patient’s resting homeostatic state.</a:t>
                       </a:r>
                       <a:endParaRPr lang="en-US" sz="1200" dirty="0"/>
                     </a:p>
                   </a:txBody>
                   <a:tcPr/>
                 </a:tc>
+                <a:extLst>
+                  <a:ext uri="{0D108BD9-81ED-4DB2-BD59-A6C34878D82A}">
+                    <a16:rowId xmlns:a16="http://schemas.microsoft.com/office/drawing/2014/main" val="10000"/>
+                  </a:ext>
+                </a:extLst>
               </a:tr>
               <a:tr h="370840">
                 <a:tc>
@@ -6484,10 +6410,9 @@
                     <a:p>
                       <a:pPr algn="ctr"/>
                       <a:r>
-                        <a:rPr lang="en-US" sz="1200" b="1" dirty="0" smtClean="0"/>
+                        <a:rPr lang="en-US" sz="1200" b="1" dirty="0"/>
                         <a:t>Secondary</a:t>
                       </a:r>
-                      <a:endParaRPr lang="en-US" sz="1200" b="1" dirty="0"/>
                     </a:p>
                   </a:txBody>
                   <a:tcPr anchor="ctr"/>
@@ -6498,50 +6423,31 @@
                     <a:lstStyle/>
                     <a:p>
                       <a:r>
-                        <a:rPr lang="en-US" sz="1200" dirty="0" smtClean="0"/>
-                        <a:t>After </a:t>
+                        <a:rPr lang="en-US" sz="1200" dirty="0"/>
+                        <a:t>After initial stabilization has been achieved, chronic conditions and certain feedback mechanism</a:t>
                       </a:r>
                       <a:r>
-                        <a:rPr lang="en-US" sz="1200" dirty="0" smtClean="0"/>
-                        <a:t>initial </a:t>
-                      </a:r>
-                      <a:r>
-                        <a:rPr lang="en-US" sz="1200" dirty="0" smtClean="0"/>
-                        <a:t>stabilization has been achieved, chronic conditions </a:t>
-                      </a:r>
-                      <a:r>
-                        <a:rPr lang="en-US" sz="1200" dirty="0" smtClean="0"/>
-                        <a:t>and certain feedback mechanism</a:t>
-                      </a:r>
-                      <a:r>
-                        <a:rPr lang="en-US" sz="1200" baseline="0" dirty="0" smtClean="0"/>
+                        <a:rPr lang="en-US" sz="1200" baseline="0" dirty="0"/>
                         <a:t>s (e.g., baroreceptors) </a:t>
                       </a:r>
                       <a:r>
-                        <a:rPr lang="en-US" sz="1200" dirty="0" smtClean="0"/>
-                        <a:t>are </a:t>
+                        <a:rPr lang="en-US" sz="1200" dirty="0"/>
+                        <a:t>are applied. Any patient parameters, environmental settings, or model values are updated to represent</a:t>
                       </a:r>
                       <a:r>
-                        <a:rPr lang="en-US" sz="1200" dirty="0" smtClean="0"/>
-                        <a:t>applied. Any patient parameters, environmental settings, or model values are updated to represent</a:t>
-                      </a:r>
-                      <a:r>
-                        <a:rPr lang="en-US" sz="1200" baseline="0" dirty="0" smtClean="0"/>
-                        <a:t> the specified condition</a:t>
-                      </a:r>
-                      <a:r>
-                        <a:rPr lang="en-US" sz="1200" baseline="0" dirty="0" smtClean="0"/>
-                        <a:t>. </a:t>
-                      </a:r>
-                      <a:r>
-                        <a:rPr lang="en-US" sz="1200" baseline="0" dirty="0" smtClean="0"/>
-                        <a:t>The engine executes until all specified stabilization criteria are satisfied.</a:t>
+                        <a:rPr lang="en-US" sz="1200" baseline="0" dirty="0"/>
+                        <a:t> the specified condition. The engine executes until all specified stabilization criteria are satisfied.</a:t>
                       </a:r>
                       <a:endParaRPr lang="en-US" sz="1200" dirty="0"/>
                     </a:p>
                   </a:txBody>
                   <a:tcPr/>
                 </a:tc>
+                <a:extLst>
+                  <a:ext uri="{0D108BD9-81ED-4DB2-BD59-A6C34878D82A}">
+                    <a16:rowId xmlns:a16="http://schemas.microsoft.com/office/drawing/2014/main" val="10001"/>
+                  </a:ext>
+                </a:extLst>
               </a:tr>
               <a:tr h="370840">
                 <a:tc>
@@ -6551,10 +6457,9 @@
                     <a:p>
                       <a:pPr algn="ctr"/>
                       <a:r>
-                        <a:rPr lang="en-US" sz="1200" b="1" dirty="0" smtClean="0"/>
+                        <a:rPr lang="en-US" sz="1200" b="1" dirty="0"/>
                         <a:t>Active</a:t>
                       </a:r>
-                      <a:endParaRPr lang="en-US" sz="1200" b="1" dirty="0"/>
                     </a:p>
                   </a:txBody>
                   <a:tcPr anchor="ctr"/>
@@ -6565,11 +6470,11 @@
                     <a:lstStyle/>
                     <a:p>
                       <a:r>
-                        <a:rPr lang="en-US" sz="1200" dirty="0" smtClean="0"/>
+                        <a:rPr lang="en-US" sz="1200" dirty="0"/>
                         <a:t>After the</a:t>
                       </a:r>
                       <a:r>
-                        <a:rPr lang="en-US" sz="1200" baseline="0" dirty="0" smtClean="0"/>
+                        <a:rPr lang="en-US" sz="1200" baseline="0" dirty="0"/>
                         <a:t> patient physiology is stable, the remainder of the scenario executes.  All feedback mechanisms are active. Further modifications are performed through actions.</a:t>
                       </a:r>
                       <a:endParaRPr lang="en-US" sz="1200" dirty="0"/>
@@ -6577,6 +6482,11 @@
                   </a:txBody>
                   <a:tcPr/>
                 </a:tc>
+                <a:extLst>
+                  <a:ext uri="{0D108BD9-81ED-4DB2-BD59-A6C34878D82A}">
+                    <a16:rowId xmlns:a16="http://schemas.microsoft.com/office/drawing/2014/main" val="10002"/>
+                  </a:ext>
+                </a:extLst>
               </a:tr>
             </a:tbl>
           </a:graphicData>
@@ -6652,10 +6562,9 @@
           <a:lstStyle/>
           <a:p>
             <a:r>
-              <a:rPr lang="en-US" sz="1400" dirty="0" smtClean="0"/>
+              <a:rPr lang="en-US" sz="1400" dirty="0"/>
               <a:t>Stabilization</a:t>
             </a:r>
-            <a:endParaRPr lang="en-US" sz="1400" dirty="0"/>
           </a:p>
         </p:txBody>
       </p:sp>
@@ -6756,10 +6665,9 @@
           <a:lstStyle/>
           <a:p>
             <a:r>
-              <a:rPr lang="en-US" sz="1400" dirty="0" smtClean="0"/>
+              <a:rPr lang="en-US" sz="1400" dirty="0"/>
               <a:t>Simulation Time = 0</a:t>
             </a:r>
-            <a:endParaRPr lang="en-US" sz="1400" dirty="0"/>
           </a:p>
         </p:txBody>
       </p:sp>
@@ -6881,18 +6789,13 @@
           <a:p>
             <a:pPr algn="r"/>
             <a:r>
-              <a:rPr lang="en-US" dirty="0" smtClean="0">
+              <a:rPr lang="en-US" dirty="0">
                 <a:solidFill>
                   <a:srgbClr val="12153E"/>
                 </a:solidFill>
               </a:rPr>
               <a:t>Brain</a:t>
             </a:r>
-            <a:endParaRPr lang="en-US" dirty="0">
-              <a:solidFill>
-                <a:srgbClr val="12153E"/>
-              </a:solidFill>
-            </a:endParaRPr>
           </a:p>
         </p:txBody>
       </p:sp>
@@ -6942,18 +6845,13 @@
           <a:p>
             <a:pPr algn="r"/>
             <a:r>
-              <a:rPr lang="en-US" dirty="0" smtClean="0">
+              <a:rPr lang="en-US" dirty="0">
                 <a:solidFill>
                   <a:srgbClr val="12153E"/>
                 </a:solidFill>
               </a:rPr>
               <a:t>Heart</a:t>
             </a:r>
-            <a:endParaRPr lang="en-US" dirty="0">
-              <a:solidFill>
-                <a:srgbClr val="12153E"/>
-              </a:solidFill>
-            </a:endParaRPr>
           </a:p>
         </p:txBody>
       </p:sp>
@@ -7003,18 +6901,13 @@
           <a:p>
             <a:pPr algn="r"/>
             <a:r>
-              <a:rPr lang="en-US" dirty="0" smtClean="0">
+              <a:rPr lang="en-US" dirty="0">
                 <a:solidFill>
                   <a:srgbClr val="12153E"/>
                 </a:solidFill>
               </a:rPr>
               <a:t>Arms</a:t>
             </a:r>
-            <a:endParaRPr lang="en-US" dirty="0">
-              <a:solidFill>
-                <a:srgbClr val="12153E"/>
-              </a:solidFill>
-            </a:endParaRPr>
           </a:p>
         </p:txBody>
       </p:sp>
@@ -7064,18 +6957,13 @@
           <a:p>
             <a:pPr algn="r"/>
             <a:r>
-              <a:rPr lang="en-US" dirty="0" smtClean="0">
+              <a:rPr lang="en-US" dirty="0">
                 <a:solidFill>
                   <a:srgbClr val="12153E"/>
                 </a:solidFill>
               </a:rPr>
               <a:t>Legs</a:t>
             </a:r>
-            <a:endParaRPr lang="en-US" dirty="0">
-              <a:solidFill>
-                <a:srgbClr val="12153E"/>
-              </a:solidFill>
-            </a:endParaRPr>
           </a:p>
         </p:txBody>
       </p:sp>
@@ -7125,18 +7013,13 @@
           <a:p>
             <a:pPr algn="r"/>
             <a:r>
-              <a:rPr lang="en-US" dirty="0" smtClean="0">
+              <a:rPr lang="en-US" dirty="0">
                 <a:solidFill>
                   <a:srgbClr val="12153E"/>
                 </a:solidFill>
               </a:rPr>
               <a:t>Core</a:t>
             </a:r>
-            <a:endParaRPr lang="en-US" dirty="0">
-              <a:solidFill>
-                <a:srgbClr val="12153E"/>
-              </a:solidFill>
-            </a:endParaRPr>
           </a:p>
         </p:txBody>
       </p:sp>
@@ -7186,18 +7069,13 @@
           <a:p>
             <a:pPr algn="r"/>
             <a:r>
-              <a:rPr lang="en-US" dirty="0" smtClean="0">
+              <a:rPr lang="en-US" dirty="0">
                 <a:solidFill>
                   <a:srgbClr val="12153E"/>
                 </a:solidFill>
               </a:rPr>
               <a:t>Liver</a:t>
             </a:r>
-            <a:endParaRPr lang="en-US" dirty="0">
-              <a:solidFill>
-                <a:srgbClr val="12153E"/>
-              </a:solidFill>
-            </a:endParaRPr>
           </a:p>
         </p:txBody>
       </p:sp>
@@ -7250,18 +7128,13 @@
           <a:p>
             <a:pPr algn="r"/>
             <a:r>
-              <a:rPr lang="en-US" dirty="0" smtClean="0">
+              <a:rPr lang="en-US" dirty="0">
                 <a:solidFill>
                   <a:srgbClr val="12153E"/>
                 </a:solidFill>
               </a:rPr>
               <a:t>Gut</a:t>
             </a:r>
-            <a:endParaRPr lang="en-US" dirty="0">
-              <a:solidFill>
-                <a:srgbClr val="12153E"/>
-              </a:solidFill>
-            </a:endParaRPr>
           </a:p>
         </p:txBody>
       </p:sp>
@@ -7311,18 +7184,13 @@
           <a:p>
             <a:pPr algn="r"/>
             <a:r>
-              <a:rPr lang="en-US" dirty="0" smtClean="0">
+              <a:rPr lang="en-US" dirty="0">
                 <a:solidFill>
                   <a:srgbClr val="12153E"/>
                 </a:solidFill>
               </a:rPr>
               <a:t>Kidneys</a:t>
             </a:r>
-            <a:endParaRPr lang="en-US" dirty="0">
-              <a:solidFill>
-                <a:srgbClr val="12153E"/>
-              </a:solidFill>
-            </a:endParaRPr>
           </a:p>
         </p:txBody>
       </p:sp>
@@ -7372,18 +7240,13 @@
           <a:p>
             <a:pPr algn="r"/>
             <a:r>
-              <a:rPr lang="en-US" dirty="0" smtClean="0">
+              <a:rPr lang="en-US" dirty="0">
                 <a:solidFill>
                   <a:srgbClr val="12153E"/>
                 </a:solidFill>
               </a:rPr>
               <a:t>Core</a:t>
             </a:r>
-            <a:endParaRPr lang="en-US" dirty="0">
-              <a:solidFill>
-                <a:srgbClr val="12153E"/>
-              </a:solidFill>
-            </a:endParaRPr>
           </a:p>
         </p:txBody>
       </p:sp>
@@ -7433,18 +7296,13 @@
           <a:p>
             <a:pPr algn="ctr"/>
             <a:r>
-              <a:rPr lang="en-US" dirty="0" smtClean="0">
+              <a:rPr lang="en-US" dirty="0">
                 <a:solidFill>
                   <a:srgbClr val="12153E"/>
                 </a:solidFill>
               </a:rPr>
               <a:t>Lungs</a:t>
             </a:r>
-            <a:endParaRPr lang="en-US" dirty="0">
-              <a:solidFill>
-                <a:srgbClr val="12153E"/>
-              </a:solidFill>
-            </a:endParaRPr>
           </a:p>
         </p:txBody>
       </p:sp>
@@ -7579,10 +7437,9 @@
           <a:lstStyle/>
           <a:p>
             <a:r>
-              <a:rPr lang="en-US" sz="1200" dirty="0" smtClean="0"/>
+              <a:rPr lang="en-US" sz="1200" dirty="0"/>
               <a:t>Environment</a:t>
             </a:r>
-            <a:endParaRPr lang="en-US" sz="1200" dirty="0"/>
           </a:p>
         </p:txBody>
       </p:sp>
@@ -7674,7 +7531,6 @@
               <a:rPr lang="en-US" dirty="0"/>
               <a:t>Cardiovascular</a:t>
             </a:r>
-            <a:endParaRPr lang="en-US" dirty="0"/>
           </a:p>
         </p:txBody>
       </p:sp>
@@ -7825,10 +7681,9 @@
           <a:lstStyle/>
           <a:p>
             <a:r>
-              <a:rPr lang="en-US" sz="1200" dirty="0" smtClean="0"/>
+              <a:rPr lang="en-US" sz="1200" dirty="0"/>
               <a:t>Anesthesia Machine</a:t>
             </a:r>
-            <a:endParaRPr lang="en-US" sz="1200" dirty="0"/>
           </a:p>
         </p:txBody>
       </p:sp>
@@ -7870,10 +7725,9 @@
           <a:p>
             <a:pPr algn="ctr"/>
             <a:r>
-              <a:rPr lang="en-US" sz="1200" dirty="0" smtClean="0"/>
+              <a:rPr lang="en-US" sz="1200" dirty="0"/>
               <a:t>Blood Chemistry</a:t>
             </a:r>
-            <a:endParaRPr lang="en-US" sz="1200" dirty="0"/>
           </a:p>
         </p:txBody>
       </p:sp>
@@ -7914,10 +7768,9 @@
           <a:lstStyle/>
           <a:p>
             <a:r>
-              <a:rPr lang="en-US" sz="1200" dirty="0" smtClean="0"/>
+              <a:rPr lang="en-US" sz="1200" dirty="0"/>
               <a:t>Inhaler</a:t>
             </a:r>
-            <a:endParaRPr lang="en-US" sz="1200" dirty="0"/>
           </a:p>
         </p:txBody>
       </p:sp>
@@ -7958,10 +7811,9 @@
           <a:lstStyle/>
           <a:p>
             <a:r>
-              <a:rPr lang="en-US" sz="1200" dirty="0" smtClean="0"/>
+              <a:rPr lang="en-US" sz="1200" dirty="0"/>
               <a:t>Drugs</a:t>
             </a:r>
-            <a:endParaRPr lang="en-US" sz="1200" dirty="0"/>
           </a:p>
         </p:txBody>
       </p:sp>
@@ -8002,10 +7854,9 @@
           <a:lstStyle/>
           <a:p>
             <a:r>
-              <a:rPr lang="en-US" sz="1200" dirty="0" smtClean="0"/>
+              <a:rPr lang="en-US" sz="1200" dirty="0"/>
               <a:t>Endocrine</a:t>
             </a:r>
-            <a:endParaRPr lang="en-US" sz="1200" dirty="0"/>
           </a:p>
         </p:txBody>
       </p:sp>
@@ -8046,10 +7897,9 @@
           <a:lstStyle/>
           <a:p>
             <a:r>
-              <a:rPr lang="en-US" sz="1200" dirty="0" smtClean="0"/>
+              <a:rPr lang="en-US" sz="1200" dirty="0"/>
               <a:t>Energy</a:t>
             </a:r>
-            <a:endParaRPr lang="en-US" sz="1200" dirty="0"/>
           </a:p>
         </p:txBody>
       </p:sp>
@@ -8090,10 +7940,9 @@
           <a:lstStyle/>
           <a:p>
             <a:r>
-              <a:rPr lang="en-US" sz="1200" dirty="0" smtClean="0"/>
+              <a:rPr lang="en-US" sz="1200" dirty="0"/>
               <a:t>Gastrointestinal</a:t>
             </a:r>
-            <a:endParaRPr lang="en-US" sz="1200" dirty="0"/>
           </a:p>
         </p:txBody>
       </p:sp>
@@ -8134,10 +7983,9 @@
           <a:lstStyle/>
           <a:p>
             <a:r>
-              <a:rPr lang="en-US" sz="1200" dirty="0" smtClean="0"/>
+              <a:rPr lang="en-US" sz="1200" dirty="0"/>
               <a:t>Nervous</a:t>
             </a:r>
-            <a:endParaRPr lang="en-US" sz="1200" dirty="0"/>
           </a:p>
         </p:txBody>
       </p:sp>
@@ -8178,10 +8026,9 @@
           <a:lstStyle/>
           <a:p>
             <a:r>
-              <a:rPr lang="en-US" sz="1200" dirty="0" smtClean="0"/>
+              <a:rPr lang="en-US" sz="1200" dirty="0"/>
               <a:t>Renal</a:t>
             </a:r>
-            <a:endParaRPr lang="en-US" sz="1200" dirty="0"/>
           </a:p>
         </p:txBody>
       </p:sp>
@@ -8222,10 +8069,9 @@
           <a:lstStyle/>
           <a:p>
             <a:r>
-              <a:rPr lang="en-US" sz="1200" dirty="0" smtClean="0"/>
+              <a:rPr lang="en-US" sz="1200" dirty="0"/>
               <a:t>Tissue</a:t>
             </a:r>
-            <a:endParaRPr lang="en-US" sz="1200" dirty="0"/>
           </a:p>
         </p:txBody>
       </p:sp>
@@ -8252,14 +8098,13 @@
           <a:lstStyle/>
           <a:p>
             <a:r>
-              <a:rPr lang="en-US" sz="900" b="1" u="sng" dirty="0" smtClean="0"/>
+              <a:rPr lang="en-US" sz="900" b="1" u="sng" dirty="0"/>
               <a:t>Connection Type:</a:t>
             </a:r>
-            <a:endParaRPr lang="en-US" sz="900" b="1" u="sng" dirty="0"/>
-          </a:p>
-          <a:p>
-            <a:r>
-              <a:rPr lang="en-US" sz="900" b="1" dirty="0" smtClean="0">
+          </a:p>
+          <a:p>
+            <a:r>
+              <a:rPr lang="en-US" sz="900" b="1" dirty="0">
                 <a:solidFill>
                   <a:schemeClr val="tx2">
                     <a:lumMod val="60000"/>
@@ -8272,7 +8117,7 @@
           </a:p>
           <a:p>
             <a:r>
-              <a:rPr lang="en-US" sz="900" b="1" dirty="0" smtClean="0">
+              <a:rPr lang="en-US" sz="900" b="1" dirty="0">
                 <a:solidFill>
                   <a:schemeClr val="accent2">
                     <a:lumMod val="60000"/>
@@ -8285,7 +8130,7 @@
           </a:p>
           <a:p>
             <a:r>
-              <a:rPr lang="en-US" sz="900" b="1" dirty="0" smtClean="0"/>
+              <a:rPr lang="en-US" sz="900" b="1" dirty="0"/>
               <a:t>Property Modifier</a:t>
             </a:r>
           </a:p>
@@ -8504,10 +8349,9 @@
           <a:lstStyle/>
           <a:p>
             <a:r>
-              <a:rPr lang="en-US" sz="900" dirty="0" smtClean="0"/>
+              <a:rPr lang="en-US" sz="900" dirty="0"/>
               <a:t>Ambient</a:t>
             </a:r>
-            <a:endParaRPr lang="en-US" sz="900" dirty="0"/>
           </a:p>
         </p:txBody>
       </p:sp>
@@ -8686,10 +8530,9 @@
           <a:lstStyle/>
           <a:p>
             <a:r>
-              <a:rPr lang="en-US" sz="900" dirty="0" smtClean="0"/>
+              <a:rPr lang="en-US" sz="900" dirty="0"/>
               <a:t>Chemoreceptor</a:t>
             </a:r>
-            <a:endParaRPr lang="en-US" sz="900" dirty="0"/>
           </a:p>
         </p:txBody>
       </p:sp>
@@ -8716,10 +8559,9 @@
           <a:lstStyle/>
           <a:p>
             <a:r>
-              <a:rPr lang="en-US" sz="900" dirty="0" smtClean="0"/>
+              <a:rPr lang="en-US" sz="900" dirty="0"/>
               <a:t>Vaporizer</a:t>
             </a:r>
-            <a:endParaRPr lang="en-US" sz="900" dirty="0"/>
           </a:p>
         </p:txBody>
       </p:sp>
@@ -8746,7 +8588,7 @@
           <a:lstStyle/>
           <a:p>
             <a:r>
-              <a:rPr lang="en-US" sz="900" dirty="0" err="1" smtClean="0"/>
+              <a:rPr lang="en-US" sz="900" dirty="0" err="1"/>
               <a:t>Aerosolizer</a:t>
             </a:r>
             <a:endParaRPr lang="en-US" sz="900" dirty="0"/>
@@ -8777,10 +8619,9 @@
           <a:p>
             <a:pPr algn="ctr"/>
             <a:r>
-              <a:rPr lang="en-US" sz="900" dirty="0" smtClean="0"/>
+              <a:rPr lang="en-US" sz="900" dirty="0"/>
               <a:t>Bolus/Infusion</a:t>
             </a:r>
-            <a:endParaRPr lang="en-US" sz="900" dirty="0"/>
           </a:p>
         </p:txBody>
       </p:sp>
@@ -9217,17 +9058,16 @@
           <a:p>
             <a:pPr algn="ctr"/>
             <a:r>
-              <a:rPr lang="en-US" sz="900" dirty="0" smtClean="0"/>
+              <a:rPr lang="en-US" sz="900" dirty="0"/>
               <a:t>Metabolic </a:t>
             </a:r>
           </a:p>
           <a:p>
             <a:pPr algn="ctr"/>
             <a:r>
-              <a:rPr lang="en-US" sz="900" dirty="0" smtClean="0"/>
+              <a:rPr lang="en-US" sz="900" dirty="0"/>
               <a:t>Response</a:t>
             </a:r>
-            <a:endParaRPr lang="en-US" sz="900" dirty="0"/>
           </a:p>
         </p:txBody>
       </p:sp>
@@ -9254,16 +9094,15 @@
           <a:lstStyle/>
           <a:p>
             <a:r>
-              <a:rPr lang="en-US" sz="900" dirty="0" smtClean="0"/>
+              <a:rPr lang="en-US" sz="900" dirty="0"/>
               <a:t>Production/</a:t>
             </a:r>
           </a:p>
           <a:p>
             <a:r>
-              <a:rPr lang="en-US" sz="900" dirty="0" smtClean="0"/>
+              <a:rPr lang="en-US" sz="900" dirty="0"/>
               <a:t>Consumption</a:t>
             </a:r>
-            <a:endParaRPr lang="en-US" sz="900" dirty="0"/>
           </a:p>
         </p:txBody>
       </p:sp>
@@ -9290,10 +9129,9 @@
           <a:lstStyle/>
           <a:p>
             <a:r>
-              <a:rPr lang="en-US" sz="900" dirty="0" smtClean="0"/>
+              <a:rPr lang="en-US" sz="900" dirty="0"/>
               <a:t>Baroreceptor</a:t>
             </a:r>
-            <a:endParaRPr lang="en-US" sz="900" dirty="0"/>
           </a:p>
         </p:txBody>
       </p:sp>
@@ -9321,17 +9159,16 @@
           <a:p>
             <a:pPr algn="ctr"/>
             <a:r>
-              <a:rPr lang="en-US" sz="900" dirty="0" smtClean="0"/>
+              <a:rPr lang="en-US" sz="900" dirty="0"/>
               <a:t>Hormone </a:t>
             </a:r>
           </a:p>
           <a:p>
             <a:pPr algn="ctr"/>
             <a:r>
-              <a:rPr lang="en-US" sz="900" dirty="0" smtClean="0"/>
+              <a:rPr lang="en-US" sz="900" dirty="0"/>
               <a:t>Release</a:t>
             </a:r>
-            <a:endParaRPr lang="en-US" sz="900" dirty="0"/>
           </a:p>
         </p:txBody>
       </p:sp>
@@ -9395,10 +9232,9 @@
           <a:p>
             <a:pPr algn="ctr"/>
             <a:r>
-              <a:rPr lang="en-US" sz="900" dirty="0" smtClean="0"/>
+              <a:rPr lang="en-US" sz="900" dirty="0"/>
               <a:t>Drug Effect</a:t>
             </a:r>
-            <a:endParaRPr lang="en-US" sz="900" dirty="0"/>
           </a:p>
         </p:txBody>
       </p:sp>
@@ -9465,10 +9301,9 @@
           <a:p>
             <a:pPr algn="ctr"/>
             <a:r>
-              <a:rPr lang="en-US" sz="900" dirty="0" smtClean="0"/>
+              <a:rPr lang="en-US" sz="900" dirty="0"/>
               <a:t>Drug Effect</a:t>
             </a:r>
-            <a:endParaRPr lang="en-US" sz="900" dirty="0"/>
           </a:p>
         </p:txBody>
       </p:sp>
@@ -9581,7 +9416,7 @@
           <a:lstStyle/>
           <a:p>
             <a:r>
-              <a:rPr lang="en-US" sz="1600" dirty="0" smtClean="0">
+              <a:rPr lang="en-US" sz="1600" dirty="0">
                 <a:solidFill>
                   <a:srgbClr val="12153E"/>
                 </a:solidFill>
@@ -9591,18 +9426,13 @@
           </a:p>
           <a:p>
             <a:r>
-              <a:rPr lang="en-US" sz="1600" dirty="0" smtClean="0">
+              <a:rPr lang="en-US" sz="1600" dirty="0">
                 <a:solidFill>
                   <a:srgbClr val="12153E"/>
                 </a:solidFill>
               </a:rPr>
               <a:t>Drug Effects</a:t>
             </a:r>
-            <a:endParaRPr lang="en-US" sz="1600" dirty="0">
-              <a:solidFill>
-                <a:srgbClr val="12153E"/>
-              </a:solidFill>
-            </a:endParaRPr>
           </a:p>
         </p:txBody>
       </p:sp>
@@ -10881,18 +10711,13 @@
             <a:p>
               <a:pPr algn="ctr"/>
               <a:r>
-                <a:rPr lang="en-US" sz="1600" dirty="0" smtClean="0">
+                <a:rPr lang="en-US" sz="1600" dirty="0">
                   <a:solidFill>
                     <a:srgbClr val="12153E"/>
                   </a:solidFill>
                 </a:rPr>
                 <a:t>Cardiovascular</a:t>
               </a:r>
-              <a:endParaRPr lang="en-US" sz="1600" dirty="0">
-                <a:solidFill>
-                  <a:srgbClr val="12153E"/>
-                </a:solidFill>
-              </a:endParaRPr>
             </a:p>
           </p:txBody>
         </p:sp>
@@ -10991,18 +10816,13 @@
             <a:p>
               <a:pPr algn="ctr"/>
               <a:r>
-                <a:rPr lang="en-US" sz="1600" dirty="0" smtClean="0">
+                <a:rPr lang="en-US" sz="1600" dirty="0">
                   <a:solidFill>
                     <a:srgbClr val="12153E"/>
                   </a:solidFill>
                 </a:rPr>
                 <a:t>Blood</a:t>
               </a:r>
-              <a:endParaRPr lang="en-US" sz="1600" dirty="0">
-                <a:solidFill>
-                  <a:srgbClr val="12153E"/>
-                </a:solidFill>
-              </a:endParaRPr>
             </a:p>
           </p:txBody>
         </p:sp>
@@ -11052,18 +10872,13 @@
             <a:p>
               <a:pPr algn="ctr"/>
               <a:r>
-                <a:rPr lang="en-US" sz="1600" dirty="0" smtClean="0">
+                <a:rPr lang="en-US" sz="1600" dirty="0">
                   <a:solidFill>
                     <a:srgbClr val="12153E"/>
                   </a:solidFill>
                 </a:rPr>
                 <a:t>Tissue</a:t>
               </a:r>
-              <a:endParaRPr lang="en-US" sz="1600" dirty="0">
-                <a:solidFill>
-                  <a:srgbClr val="12153E"/>
-                </a:solidFill>
-              </a:endParaRPr>
             </a:p>
           </p:txBody>
         </p:sp>
@@ -11113,18 +10928,13 @@
             <a:p>
               <a:pPr algn="ctr"/>
               <a:r>
-                <a:rPr lang="en-US" sz="1600" dirty="0" smtClean="0">
+                <a:rPr lang="en-US" sz="1600" dirty="0">
                   <a:solidFill>
                     <a:srgbClr val="12153E"/>
                   </a:solidFill>
                 </a:rPr>
                 <a:t>Extravascular</a:t>
               </a:r>
-              <a:endParaRPr lang="en-US" sz="1600" dirty="0">
-                <a:solidFill>
-                  <a:srgbClr val="12153E"/>
-                </a:solidFill>
-              </a:endParaRPr>
             </a:p>
           </p:txBody>
         </p:sp>
@@ -11175,18 +10985,13 @@
           <a:p>
             <a:pPr algn="ctr"/>
             <a:r>
-              <a:rPr lang="en-US" sz="1600" dirty="0" smtClean="0">
+              <a:rPr lang="en-US" sz="1600" dirty="0">
                 <a:solidFill>
                   <a:srgbClr val="12153E"/>
                 </a:solidFill>
               </a:rPr>
               <a:t>Respiratory</a:t>
             </a:r>
-            <a:endParaRPr lang="en-US" sz="1600" dirty="0">
-              <a:solidFill>
-                <a:srgbClr val="12153E"/>
-              </a:solidFill>
-            </a:endParaRPr>
           </a:p>
         </p:txBody>
       </p:sp>
@@ -11236,18 +11041,13 @@
           <a:p>
             <a:pPr algn="ctr"/>
             <a:r>
-              <a:rPr lang="en-US" sz="1600" dirty="0" smtClean="0">
+              <a:rPr lang="en-US" sz="1600" dirty="0">
                 <a:solidFill>
                   <a:srgbClr val="12153E"/>
                 </a:solidFill>
               </a:rPr>
               <a:t>Anesthesia Machine</a:t>
             </a:r>
-            <a:endParaRPr lang="en-US" sz="1600" dirty="0">
-              <a:solidFill>
-                <a:srgbClr val="12153E"/>
-              </a:solidFill>
-            </a:endParaRPr>
           </a:p>
         </p:txBody>
       </p:sp>
@@ -11337,18 +11137,13 @@
           <a:p>
             <a:pPr algn="ctr"/>
             <a:r>
-              <a:rPr lang="en-US" sz="1600" dirty="0" smtClean="0">
+              <a:rPr lang="en-US" sz="1600" dirty="0">
                 <a:solidFill>
                   <a:srgbClr val="12153E"/>
                 </a:solidFill>
               </a:rPr>
               <a:t>Renal</a:t>
             </a:r>
-            <a:endParaRPr lang="en-US" sz="1600" dirty="0">
-              <a:solidFill>
-                <a:srgbClr val="12153E"/>
-              </a:solidFill>
-            </a:endParaRPr>
           </a:p>
         </p:txBody>
       </p:sp>
@@ -11438,18 +11233,13 @@
           <a:p>
             <a:pPr algn="ctr"/>
             <a:r>
-              <a:rPr lang="en-US" sz="1600" dirty="0" smtClean="0">
+              <a:rPr lang="en-US" sz="1600" dirty="0">
                 <a:solidFill>
                   <a:srgbClr val="12153E"/>
                 </a:solidFill>
               </a:rPr>
               <a:t>Gastrointestinal</a:t>
             </a:r>
-            <a:endParaRPr lang="en-US" sz="1600" dirty="0">
-              <a:solidFill>
-                <a:srgbClr val="12153E"/>
-              </a:solidFill>
-            </a:endParaRPr>
           </a:p>
         </p:txBody>
       </p:sp>
@@ -11499,18 +11289,13 @@
           <a:p>
             <a:pPr algn="ctr"/>
             <a:r>
-              <a:rPr lang="en-US" sz="1600" dirty="0" smtClean="0">
+              <a:rPr lang="en-US" sz="1600" dirty="0">
                 <a:solidFill>
                   <a:srgbClr val="12153E"/>
                 </a:solidFill>
               </a:rPr>
               <a:t>Energy</a:t>
             </a:r>
-            <a:endParaRPr lang="en-US" sz="1600" dirty="0">
-              <a:solidFill>
-                <a:srgbClr val="12153E"/>
-              </a:solidFill>
-            </a:endParaRPr>
           </a:p>
         </p:txBody>
       </p:sp>
@@ -11921,18 +11706,13 @@
           <a:p>
             <a:pPr algn="ctr"/>
             <a:r>
-              <a:rPr lang="en-US" sz="1600" dirty="0" smtClean="0">
+              <a:rPr lang="en-US" sz="1600" dirty="0">
                 <a:solidFill>
                   <a:srgbClr val="12153E"/>
                 </a:solidFill>
               </a:rPr>
               <a:t>Nervous</a:t>
             </a:r>
-            <a:endParaRPr lang="en-US" sz="1600" dirty="0">
-              <a:solidFill>
-                <a:srgbClr val="12153E"/>
-              </a:solidFill>
-            </a:endParaRPr>
           </a:p>
         </p:txBody>
       </p:sp>
@@ -11982,18 +11762,13 @@
           <a:p>
             <a:pPr algn="ctr"/>
             <a:r>
-              <a:rPr lang="en-US" sz="1600" dirty="0" smtClean="0">
+              <a:rPr lang="en-US" sz="1600" dirty="0">
                 <a:solidFill>
                   <a:srgbClr val="12153E"/>
                 </a:solidFill>
               </a:rPr>
               <a:t>Endocrine</a:t>
             </a:r>
-            <a:endParaRPr lang="en-US" sz="1600" dirty="0">
-              <a:solidFill>
-                <a:srgbClr val="12153E"/>
-              </a:solidFill>
-            </a:endParaRPr>
           </a:p>
         </p:txBody>
       </p:sp>
@@ -13091,18 +12866,13 @@
             <a:p>
               <a:pPr algn="ctr"/>
               <a:r>
-                <a:rPr lang="en-US" dirty="0" smtClean="0">
+                <a:rPr lang="en-US" dirty="0">
                   <a:solidFill>
                     <a:srgbClr val="216AAF"/>
                   </a:solidFill>
                 </a:rPr>
                 <a:t>Body</a:t>
               </a:r>
-              <a:endParaRPr lang="en-US" dirty="0">
-                <a:solidFill>
-                  <a:srgbClr val="216AAF"/>
-                </a:solidFill>
-              </a:endParaRPr>
             </a:p>
           </p:txBody>
         </p:sp>
@@ -13133,18 +12903,13 @@
             <a:p>
               <a:pPr algn="ctr"/>
               <a:r>
-                <a:rPr lang="en-US" dirty="0" smtClean="0">
+                <a:rPr lang="en-US" dirty="0">
                   <a:solidFill>
                     <a:srgbClr val="216AAF"/>
                   </a:solidFill>
                 </a:rPr>
                 <a:t>Systems</a:t>
               </a:r>
-              <a:endParaRPr lang="en-US" dirty="0">
-                <a:solidFill>
-                  <a:srgbClr val="216AAF"/>
-                </a:solidFill>
-              </a:endParaRPr>
             </a:p>
           </p:txBody>
         </p:sp>
@@ -13175,18 +12940,13 @@
             <a:p>
               <a:pPr algn="ctr"/>
               <a:r>
-                <a:rPr lang="en-US" dirty="0" smtClean="0">
+                <a:rPr lang="en-US" dirty="0">
                   <a:solidFill>
                     <a:srgbClr val="216AAF"/>
                   </a:solidFill>
                 </a:rPr>
                 <a:t>Organs</a:t>
               </a:r>
-              <a:endParaRPr lang="en-US" dirty="0">
-                <a:solidFill>
-                  <a:srgbClr val="216AAF"/>
-                </a:solidFill>
-              </a:endParaRPr>
             </a:p>
           </p:txBody>
         </p:sp>
@@ -13217,18 +12977,13 @@
             <a:p>
               <a:pPr algn="ctr"/>
               <a:r>
-                <a:rPr lang="en-US" dirty="0" smtClean="0">
+                <a:rPr lang="en-US" dirty="0">
                   <a:solidFill>
                     <a:srgbClr val="216AAF"/>
                   </a:solidFill>
                 </a:rPr>
                 <a:t>Tissues</a:t>
               </a:r>
-              <a:endParaRPr lang="en-US" dirty="0">
-                <a:solidFill>
-                  <a:srgbClr val="216AAF"/>
-                </a:solidFill>
-              </a:endParaRPr>
             </a:p>
           </p:txBody>
         </p:sp>
@@ -13259,18 +13014,13 @@
             <a:p>
               <a:pPr algn="ctr"/>
               <a:r>
-                <a:rPr lang="en-US" dirty="0" smtClean="0">
+                <a:rPr lang="en-US" dirty="0">
                   <a:solidFill>
                     <a:srgbClr val="216AAF"/>
                   </a:solidFill>
                 </a:rPr>
                 <a:t>Cells</a:t>
               </a:r>
-              <a:endParaRPr lang="en-US" dirty="0">
-                <a:solidFill>
-                  <a:srgbClr val="216AAF"/>
-                </a:solidFill>
-              </a:endParaRPr>
             </a:p>
           </p:txBody>
         </p:sp>
@@ -13301,18 +13051,13 @@
             <a:p>
               <a:pPr algn="ctr"/>
               <a:r>
-                <a:rPr lang="en-US" dirty="0" smtClean="0">
+                <a:rPr lang="en-US" dirty="0">
                   <a:solidFill>
                     <a:srgbClr val="216AAF"/>
                   </a:solidFill>
                 </a:rPr>
                 <a:t>Proteins</a:t>
               </a:r>
-              <a:endParaRPr lang="en-US" dirty="0">
-                <a:solidFill>
-                  <a:srgbClr val="216AAF"/>
-                </a:solidFill>
-              </a:endParaRPr>
             </a:p>
           </p:txBody>
         </p:sp>
@@ -13343,18 +13088,13 @@
             <a:p>
               <a:pPr algn="ctr"/>
               <a:r>
-                <a:rPr lang="en-US" dirty="0" smtClean="0">
+                <a:rPr lang="en-US" dirty="0">
                   <a:solidFill>
                     <a:srgbClr val="216AAF"/>
                   </a:solidFill>
                 </a:rPr>
                 <a:t>Genes</a:t>
               </a:r>
-              <a:endParaRPr lang="en-US" dirty="0">
-                <a:solidFill>
-                  <a:srgbClr val="216AAF"/>
-                </a:solidFill>
-              </a:endParaRPr>
             </a:p>
           </p:txBody>
         </p:sp>
@@ -13367,8 +13107,8 @@
         </p:nvSpPr>
         <p:spPr>
           <a:xfrm>
-            <a:off x="1633803" y="1403866"/>
-            <a:ext cx="2525563" cy="369332"/>
+            <a:off x="2075203" y="1403866"/>
+            <a:ext cx="1635063" cy="369332"/>
           </a:xfrm>
           <a:prstGeom prst="rect">
             <a:avLst/>
@@ -13382,34 +13122,13 @@
           <a:lstStyle/>
           <a:p>
             <a:r>
-              <a:rPr lang="en-US" dirty="0" smtClean="0">
+              <a:rPr lang="en-US" dirty="0">
                 <a:solidFill>
                   <a:prstClr val="black"/>
                 </a:solidFill>
               </a:rPr>
-              <a:t>Current </a:t>
-            </a:r>
-            <a:r>
-              <a:rPr lang="en-US" dirty="0" err="1" smtClean="0">
-                <a:solidFill>
-                  <a:prstClr val="black"/>
-                </a:solidFill>
-              </a:rPr>
-              <a:t>BioGears</a:t>
-            </a:r>
-            <a:r>
-              <a:rPr lang="en-US" dirty="0" smtClean="0">
-                <a:solidFill>
-                  <a:prstClr val="black"/>
-                </a:solidFill>
-              </a:rPr>
-              <a:t> Fidelity</a:t>
-            </a:r>
-            <a:endParaRPr lang="en-US" dirty="0">
-              <a:solidFill>
-                <a:prstClr val="black"/>
-              </a:solidFill>
-            </a:endParaRPr>
+              <a:t>Current Fidelity</a:t>
+            </a:r>
           </a:p>
         </p:txBody>
       </p:sp>
@@ -13485,18 +13204,13 @@
           <a:lstStyle/>
           <a:p>
             <a:r>
-              <a:rPr lang="en-US" dirty="0" smtClean="0">
+              <a:rPr lang="en-US" dirty="0">
                 <a:solidFill>
                   <a:prstClr val="black"/>
                 </a:solidFill>
               </a:rPr>
               <a:t>Possible Extensions</a:t>
             </a:r>
-            <a:endParaRPr lang="en-US" dirty="0">
-              <a:solidFill>
-                <a:prstClr val="black"/>
-              </a:solidFill>
-            </a:endParaRPr>
           </a:p>
         </p:txBody>
       </p:sp>
@@ -13537,16 +13251,634 @@
           </a:fontRef>
         </p:style>
       </p:cxnSp>
+    </p:spTree>
+    <p:extLst>
+      <p:ext uri="{BB962C8B-B14F-4D97-AF65-F5344CB8AC3E}">
+        <p14:creationId xmlns:p14="http://schemas.microsoft.com/office/powerpoint/2010/main" val="2649033550"/>
+      </p:ext>
+    </p:extLst>
+  </p:cSld>
+  <p:clrMapOvr>
+    <a:masterClrMapping/>
+  </p:clrMapOvr>
+</p:sld>
+</file>
+
+<file path=ppt/slides/slide6.xml><?xml version="1.0" encoding="utf-8"?>
+<p:sld xmlns:a="http://schemas.openxmlformats.org/drawingml/2006/main" xmlns:r="http://schemas.openxmlformats.org/officeDocument/2006/relationships" xmlns:p="http://schemas.openxmlformats.org/presentationml/2006/main">
+  <p:cSld>
+    <p:spTree>
+      <p:nvGrpSpPr>
+        <p:cNvPr id="1" name=""/>
+        <p:cNvGrpSpPr/>
+        <p:nvPr/>
+      </p:nvGrpSpPr>
+      <p:grpSpPr>
+        <a:xfrm>
+          <a:off x="0" y="0"/>
+          <a:ext cx="0" cy="0"/>
+          <a:chOff x="0" y="0"/>
+          <a:chExt cx="0" cy="0"/>
+        </a:xfrm>
+      </p:grpSpPr>
+      <p:sp>
+        <p:nvSpPr>
+          <p:cNvPr id="18" name="Down Arrow 17"/>
+          <p:cNvSpPr/>
+          <p:nvPr/>
+        </p:nvSpPr>
+        <p:spPr>
+          <a:xfrm rot="16200000">
+            <a:off x="2690380" y="3637629"/>
+            <a:ext cx="486640" cy="533400"/>
+          </a:xfrm>
+          <a:prstGeom prst="downArrow">
+            <a:avLst/>
+          </a:prstGeom>
+        </p:spPr>
+        <p:style>
+          <a:lnRef idx="2">
+            <a:schemeClr val="dk1">
+              <a:shade val="50000"/>
+            </a:schemeClr>
+          </a:lnRef>
+          <a:fillRef idx="1">
+            <a:schemeClr val="dk1"/>
+          </a:fillRef>
+          <a:effectRef idx="0">
+            <a:schemeClr val="dk1"/>
+          </a:effectRef>
+          <a:fontRef idx="minor">
+            <a:schemeClr val="lt1"/>
+          </a:fontRef>
+        </p:style>
+        <p:txBody>
+          <a:bodyPr rtlCol="0" anchor="ctr"/>
+          <a:lstStyle/>
+          <a:p>
+            <a:pPr algn="ctr"/>
+            <a:endParaRPr lang="en-US">
+              <a:solidFill>
+                <a:prstClr val="white"/>
+              </a:solidFill>
+            </a:endParaRPr>
+          </a:p>
+        </p:txBody>
+      </p:sp>
+      <p:sp>
+        <p:nvSpPr>
+          <p:cNvPr id="6" name="Rounded Rectangle 5"/>
+          <p:cNvSpPr/>
+          <p:nvPr/>
+        </p:nvSpPr>
+        <p:spPr>
+          <a:xfrm>
+            <a:off x="43621" y="3584001"/>
+            <a:ext cx="2547179" cy="683200"/>
+          </a:xfrm>
+          <a:prstGeom prst="roundRect">
+            <a:avLst/>
+          </a:prstGeom>
+        </p:spPr>
+        <p:style>
+          <a:lnRef idx="2">
+            <a:schemeClr val="accent1">
+              <a:shade val="50000"/>
+            </a:schemeClr>
+          </a:lnRef>
+          <a:fillRef idx="1">
+            <a:schemeClr val="accent1"/>
+          </a:fillRef>
+          <a:effectRef idx="0">
+            <a:schemeClr val="accent1"/>
+          </a:effectRef>
+          <a:fontRef idx="minor">
+            <a:schemeClr val="lt1"/>
+          </a:fontRef>
+        </p:style>
+        <p:txBody>
+          <a:bodyPr rtlCol="0" anchor="t" anchorCtr="0"/>
+          <a:lstStyle/>
+          <a:p>
+            <a:pPr algn="ctr"/>
+            <a:r>
+              <a:rPr lang="en-US" sz="1050" b="1" u="sng" dirty="0">
+                <a:solidFill>
+                  <a:prstClr val="white"/>
+                </a:solidFill>
+              </a:rPr>
+              <a:t>Preprocess</a:t>
+            </a:r>
+          </a:p>
+          <a:p>
+            <a:r>
+              <a:rPr lang="en-US" sz="1050" dirty="0">
+                <a:solidFill>
+                  <a:prstClr val="white"/>
+                </a:solidFill>
+              </a:rPr>
+              <a:t>Uses feedback mechanisms to modify elements for the next time step.</a:t>
+            </a:r>
+          </a:p>
+        </p:txBody>
+      </p:sp>
+      <p:sp>
+        <p:nvSpPr>
+          <p:cNvPr id="26" name="Rounded Rectangle 25"/>
+          <p:cNvSpPr/>
+          <p:nvPr/>
+        </p:nvSpPr>
+        <p:spPr>
+          <a:xfrm>
+            <a:off x="3304670" y="3584001"/>
+            <a:ext cx="2547179" cy="683200"/>
+          </a:xfrm>
+          <a:prstGeom prst="roundRect">
+            <a:avLst/>
+          </a:prstGeom>
+        </p:spPr>
+        <p:style>
+          <a:lnRef idx="2">
+            <a:schemeClr val="accent1">
+              <a:shade val="50000"/>
+            </a:schemeClr>
+          </a:lnRef>
+          <a:fillRef idx="1">
+            <a:schemeClr val="accent1"/>
+          </a:fillRef>
+          <a:effectRef idx="0">
+            <a:schemeClr val="accent1"/>
+          </a:effectRef>
+          <a:fontRef idx="minor">
+            <a:schemeClr val="lt1"/>
+          </a:fontRef>
+        </p:style>
+        <p:txBody>
+          <a:bodyPr rtlCol="0" anchor="t" anchorCtr="0"/>
+          <a:lstStyle/>
+          <a:p>
+            <a:pPr algn="ctr"/>
+            <a:r>
+              <a:rPr lang="en-US" sz="1050" b="1" u="sng" dirty="0">
+                <a:solidFill>
+                  <a:prstClr val="white"/>
+                </a:solidFill>
+              </a:rPr>
+              <a:t>Process</a:t>
+            </a:r>
+          </a:p>
+          <a:p>
+            <a:r>
+              <a:rPr lang="en-US" sz="1050" dirty="0">
+                <a:solidFill>
+                  <a:prstClr val="white"/>
+                </a:solidFill>
+              </a:rPr>
+              <a:t>Calculates the entire state of the system for the next time step.</a:t>
+            </a:r>
+          </a:p>
+        </p:txBody>
+      </p:sp>
+      <p:sp>
+        <p:nvSpPr>
+          <p:cNvPr id="27" name="Rounded Rectangle 26"/>
+          <p:cNvSpPr/>
+          <p:nvPr/>
+        </p:nvSpPr>
+        <p:spPr>
+          <a:xfrm>
+            <a:off x="6565719" y="3584001"/>
+            <a:ext cx="2547179" cy="683200"/>
+          </a:xfrm>
+          <a:prstGeom prst="roundRect">
+            <a:avLst/>
+          </a:prstGeom>
+        </p:spPr>
+        <p:style>
+          <a:lnRef idx="2">
+            <a:schemeClr val="accent1">
+              <a:shade val="50000"/>
+            </a:schemeClr>
+          </a:lnRef>
+          <a:fillRef idx="1">
+            <a:schemeClr val="accent1"/>
+          </a:fillRef>
+          <a:effectRef idx="0">
+            <a:schemeClr val="accent1"/>
+          </a:effectRef>
+          <a:fontRef idx="minor">
+            <a:schemeClr val="lt1"/>
+          </a:fontRef>
+        </p:style>
+        <p:txBody>
+          <a:bodyPr rtlCol="0" anchor="t" anchorCtr="0"/>
+          <a:lstStyle/>
+          <a:p>
+            <a:pPr algn="ctr"/>
+            <a:r>
+              <a:rPr lang="en-US" sz="1050" b="1" u="sng" dirty="0" err="1">
+                <a:solidFill>
+                  <a:prstClr val="white"/>
+                </a:solidFill>
+              </a:rPr>
+              <a:t>PostProcess</a:t>
+            </a:r>
+            <a:endParaRPr lang="en-US" sz="1050" b="1" u="sng" dirty="0">
+              <a:solidFill>
+                <a:prstClr val="white"/>
+              </a:solidFill>
+            </a:endParaRPr>
+          </a:p>
+          <a:p>
+            <a:r>
+              <a:rPr lang="en-US" sz="1050" dirty="0">
+                <a:solidFill>
+                  <a:prstClr val="white"/>
+                </a:solidFill>
+              </a:rPr>
+              <a:t>Advances time by moving the next time step to current.</a:t>
+            </a:r>
+          </a:p>
+        </p:txBody>
+      </p:sp>
+      <p:sp>
+        <p:nvSpPr>
+          <p:cNvPr id="28" name="Rounded Rectangle 27"/>
+          <p:cNvSpPr/>
+          <p:nvPr/>
+        </p:nvSpPr>
+        <p:spPr>
+          <a:xfrm>
+            <a:off x="4419600" y="1736495"/>
+            <a:ext cx="2547179" cy="701905"/>
+          </a:xfrm>
+          <a:prstGeom prst="roundRect">
+            <a:avLst/>
+          </a:prstGeom>
+        </p:spPr>
+        <p:style>
+          <a:lnRef idx="2">
+            <a:schemeClr val="accent1">
+              <a:shade val="50000"/>
+            </a:schemeClr>
+          </a:lnRef>
+          <a:fillRef idx="1">
+            <a:schemeClr val="accent1"/>
+          </a:fillRef>
+          <a:effectRef idx="0">
+            <a:schemeClr val="accent1"/>
+          </a:effectRef>
+          <a:fontRef idx="minor">
+            <a:schemeClr val="lt1"/>
+          </a:fontRef>
+        </p:style>
+        <p:txBody>
+          <a:bodyPr rtlCol="0" anchor="t" anchorCtr="0"/>
+          <a:lstStyle/>
+          <a:p>
+            <a:pPr algn="ctr"/>
+            <a:r>
+              <a:rPr lang="en-US" sz="1050" b="1" u="sng" dirty="0">
+                <a:solidFill>
+                  <a:prstClr val="white"/>
+                </a:solidFill>
+              </a:rPr>
+              <a:t>Assessments</a:t>
+            </a:r>
+          </a:p>
+          <a:p>
+            <a:r>
+              <a:rPr lang="en-US" sz="1050" dirty="0">
+                <a:solidFill>
+                  <a:prstClr val="white"/>
+                </a:solidFill>
+              </a:rPr>
+              <a:t>Called on demand to calculate and set assessment specific data.</a:t>
+            </a:r>
+          </a:p>
+        </p:txBody>
+      </p:sp>
+      <p:sp>
+        <p:nvSpPr>
+          <p:cNvPr id="31" name="Rounded Rectangle 30"/>
+          <p:cNvSpPr/>
+          <p:nvPr/>
+        </p:nvSpPr>
+        <p:spPr>
+          <a:xfrm>
+            <a:off x="43620" y="480447"/>
+            <a:ext cx="2547179" cy="472033"/>
+          </a:xfrm>
+          <a:prstGeom prst="roundRect">
+            <a:avLst/>
+          </a:prstGeom>
+        </p:spPr>
+        <p:style>
+          <a:lnRef idx="2">
+            <a:schemeClr val="accent1">
+              <a:shade val="50000"/>
+            </a:schemeClr>
+          </a:lnRef>
+          <a:fillRef idx="1">
+            <a:schemeClr val="accent1"/>
+          </a:fillRef>
+          <a:effectRef idx="0">
+            <a:schemeClr val="accent1"/>
+          </a:effectRef>
+          <a:fontRef idx="minor">
+            <a:schemeClr val="lt1"/>
+          </a:fontRef>
+        </p:style>
+        <p:txBody>
+          <a:bodyPr rtlCol="0" anchor="t" anchorCtr="0"/>
+          <a:lstStyle/>
+          <a:p>
+            <a:pPr algn="ctr"/>
+            <a:r>
+              <a:rPr lang="en-US" sz="1050" b="1" u="sng" dirty="0">
+                <a:solidFill>
+                  <a:prstClr val="white"/>
+                </a:solidFill>
+              </a:rPr>
+              <a:t>Reset</a:t>
+            </a:r>
+          </a:p>
+          <a:p>
+            <a:r>
+              <a:rPr lang="en-US" sz="1050" dirty="0">
+                <a:solidFill>
+                  <a:prstClr val="white"/>
+                </a:solidFill>
+              </a:rPr>
+              <a:t>Initializes the system.</a:t>
+            </a:r>
+          </a:p>
+        </p:txBody>
+      </p:sp>
+      <p:sp>
+        <p:nvSpPr>
+          <p:cNvPr id="33" name="Rounded Rectangle 32"/>
+          <p:cNvSpPr/>
+          <p:nvPr/>
+        </p:nvSpPr>
+        <p:spPr>
+          <a:xfrm>
+            <a:off x="43621" y="1658724"/>
+            <a:ext cx="2524974" cy="1198756"/>
+          </a:xfrm>
+          <a:prstGeom prst="roundRect">
+            <a:avLst/>
+          </a:prstGeom>
+        </p:spPr>
+        <p:style>
+          <a:lnRef idx="2">
+            <a:schemeClr val="accent1">
+              <a:shade val="50000"/>
+            </a:schemeClr>
+          </a:lnRef>
+          <a:fillRef idx="1">
+            <a:schemeClr val="accent1"/>
+          </a:fillRef>
+          <a:effectRef idx="0">
+            <a:schemeClr val="accent1"/>
+          </a:effectRef>
+          <a:fontRef idx="minor">
+            <a:schemeClr val="lt1"/>
+          </a:fontRef>
+        </p:style>
+        <p:txBody>
+          <a:bodyPr rtlCol="0" anchor="t" anchorCtr="0"/>
+          <a:lstStyle/>
+          <a:p>
+            <a:pPr algn="ctr"/>
+            <a:r>
+              <a:rPr lang="en-US" sz="1050" b="1" u="sng" dirty="0">
+                <a:solidFill>
+                  <a:prstClr val="white"/>
+                </a:solidFill>
+              </a:rPr>
+              <a:t>Initialization</a:t>
+            </a:r>
+          </a:p>
+          <a:p>
+            <a:r>
+              <a:rPr lang="en-US" sz="1050" b="1" dirty="0"/>
+              <a:t>Resting</a:t>
+            </a:r>
+            <a:r>
+              <a:rPr lang="en-US" sz="1050" dirty="0"/>
+              <a:t>: Functionality specific to resting patient stabilization</a:t>
+            </a:r>
+          </a:p>
+          <a:p>
+            <a:endParaRPr lang="en-US" sz="1050" dirty="0"/>
+          </a:p>
+          <a:p>
+            <a:r>
+              <a:rPr lang="en-US" sz="1050" b="1" dirty="0">
+                <a:solidFill>
+                  <a:prstClr val="white"/>
+                </a:solidFill>
+              </a:rPr>
+              <a:t>Conditions</a:t>
+            </a:r>
+            <a:r>
+              <a:rPr lang="en-US" sz="1050" dirty="0">
+                <a:solidFill>
+                  <a:prstClr val="white"/>
+                </a:solidFill>
+              </a:rPr>
+              <a:t>: Functionality specific to applying conditions</a:t>
+            </a:r>
+          </a:p>
+        </p:txBody>
+      </p:sp>
+      <p:sp>
+        <p:nvSpPr>
+          <p:cNvPr id="34" name="Down Arrow 33"/>
+          <p:cNvSpPr/>
+          <p:nvPr/>
+        </p:nvSpPr>
+        <p:spPr>
+          <a:xfrm rot="16200000">
+            <a:off x="5966980" y="3637630"/>
+            <a:ext cx="486640" cy="533400"/>
+          </a:xfrm>
+          <a:prstGeom prst="downArrow">
+            <a:avLst/>
+          </a:prstGeom>
+        </p:spPr>
+        <p:style>
+          <a:lnRef idx="2">
+            <a:schemeClr val="dk1">
+              <a:shade val="50000"/>
+            </a:schemeClr>
+          </a:lnRef>
+          <a:fillRef idx="1">
+            <a:schemeClr val="dk1"/>
+          </a:fillRef>
+          <a:effectRef idx="0">
+            <a:schemeClr val="dk1"/>
+          </a:effectRef>
+          <a:fontRef idx="minor">
+            <a:schemeClr val="lt1"/>
+          </a:fontRef>
+        </p:style>
+        <p:txBody>
+          <a:bodyPr rtlCol="0" anchor="ctr"/>
+          <a:lstStyle/>
+          <a:p>
+            <a:pPr algn="ctr"/>
+            <a:endParaRPr lang="en-US">
+              <a:solidFill>
+                <a:prstClr val="white"/>
+              </a:solidFill>
+            </a:endParaRPr>
+          </a:p>
+        </p:txBody>
+      </p:sp>
+      <p:sp>
+        <p:nvSpPr>
+          <p:cNvPr id="35" name="Down Arrow 34"/>
+          <p:cNvSpPr/>
+          <p:nvPr/>
+        </p:nvSpPr>
+        <p:spPr>
+          <a:xfrm>
+            <a:off x="1062788" y="2960137"/>
+            <a:ext cx="486640" cy="533400"/>
+          </a:xfrm>
+          <a:prstGeom prst="downArrow">
+            <a:avLst/>
+          </a:prstGeom>
+        </p:spPr>
+        <p:style>
+          <a:lnRef idx="2">
+            <a:schemeClr val="dk1">
+              <a:shade val="50000"/>
+            </a:schemeClr>
+          </a:lnRef>
+          <a:fillRef idx="1">
+            <a:schemeClr val="dk1"/>
+          </a:fillRef>
+          <a:effectRef idx="0">
+            <a:schemeClr val="dk1"/>
+          </a:effectRef>
+          <a:fontRef idx="minor">
+            <a:schemeClr val="lt1"/>
+          </a:fontRef>
+        </p:style>
+        <p:txBody>
+          <a:bodyPr rtlCol="0" anchor="ctr"/>
+          <a:lstStyle/>
+          <a:p>
+            <a:pPr algn="ctr"/>
+            <a:endParaRPr lang="en-US">
+              <a:solidFill>
+                <a:prstClr val="white"/>
+              </a:solidFill>
+            </a:endParaRPr>
+          </a:p>
+        </p:txBody>
+      </p:sp>
+      <p:sp>
+        <p:nvSpPr>
+          <p:cNvPr id="36" name="Down Arrow 35"/>
+          <p:cNvSpPr/>
+          <p:nvPr/>
+        </p:nvSpPr>
+        <p:spPr>
+          <a:xfrm>
+            <a:off x="1062788" y="1028680"/>
+            <a:ext cx="486640" cy="533400"/>
+          </a:xfrm>
+          <a:prstGeom prst="downArrow">
+            <a:avLst/>
+          </a:prstGeom>
+        </p:spPr>
+        <p:style>
+          <a:lnRef idx="2">
+            <a:schemeClr val="dk1">
+              <a:shade val="50000"/>
+            </a:schemeClr>
+          </a:lnRef>
+          <a:fillRef idx="1">
+            <a:schemeClr val="dk1"/>
+          </a:fillRef>
+          <a:effectRef idx="0">
+            <a:schemeClr val="dk1"/>
+          </a:effectRef>
+          <a:fontRef idx="minor">
+            <a:schemeClr val="lt1"/>
+          </a:fontRef>
+        </p:style>
+        <p:txBody>
+          <a:bodyPr rtlCol="0" anchor="ctr"/>
+          <a:lstStyle/>
+          <a:p>
+            <a:pPr algn="ctr"/>
+            <a:endParaRPr lang="en-US">
+              <a:solidFill>
+                <a:prstClr val="white"/>
+              </a:solidFill>
+            </a:endParaRPr>
+          </a:p>
+        </p:txBody>
+      </p:sp>
+      <p:sp>
+        <p:nvSpPr>
+          <p:cNvPr id="2" name="U-Turn Arrow 1"/>
+          <p:cNvSpPr/>
+          <p:nvPr/>
+        </p:nvSpPr>
+        <p:spPr>
+          <a:xfrm rot="10800000">
+            <a:off x="1056329" y="4343400"/>
+            <a:ext cx="6938212" cy="1066800"/>
+          </a:xfrm>
+          <a:prstGeom prst="uturnArrow">
+            <a:avLst/>
+          </a:prstGeom>
+        </p:spPr>
+        <p:style>
+          <a:lnRef idx="2">
+            <a:schemeClr val="dk1">
+              <a:shade val="50000"/>
+            </a:schemeClr>
+          </a:lnRef>
+          <a:fillRef idx="1">
+            <a:schemeClr val="dk1"/>
+          </a:fillRef>
+          <a:effectRef idx="0">
+            <a:schemeClr val="dk1"/>
+          </a:effectRef>
+          <a:fontRef idx="minor">
+            <a:schemeClr val="lt1"/>
+          </a:fontRef>
+        </p:style>
+        <p:txBody>
+          <a:bodyPr rtlCol="0" anchor="ctr"/>
+          <a:lstStyle/>
+          <a:p>
+            <a:pPr algn="ctr"/>
+            <a:endParaRPr lang="en-US">
+              <a:solidFill>
+                <a:prstClr val="white"/>
+              </a:solidFill>
+            </a:endParaRPr>
+          </a:p>
+        </p:txBody>
+      </p:sp>
       <p:pic>
         <p:nvPicPr>
-          <p:cNvPr id="4098" name="Picture 2"/>
+          <p:cNvPr id="6146" name="Picture 2"/>
           <p:cNvPicPr>
             <a:picLocks noChangeAspect="1" noChangeArrowheads="1"/>
           </p:cNvPicPr>
           <p:nvPr/>
         </p:nvPicPr>
         <p:blipFill>
-          <a:blip r:embed="rId11" cstate="print">
+          <a:blip r:embed="rId2" cstate="print">
             <a:extLst>
               <a:ext uri="{28A0092B-C50C-407E-A947-70E740481C1C}">
                 <a14:useLocalDpi xmlns:a14="http://schemas.microsoft.com/office/drawing/2010/main" val="0"/>
@@ -13560,8 +13892,8 @@
         </p:blipFill>
         <p:spPr bwMode="auto">
           <a:xfrm>
-            <a:off x="3046748" y="4267200"/>
-            <a:ext cx="3168285" cy="643264"/>
+            <a:off x="3509046" y="3584001"/>
+            <a:ext cx="5544586" cy="3020977"/>
           </a:xfrm>
           <a:prstGeom prst="rect">
             <a:avLst/>
@@ -13604,732 +13936,6 @@
     </p:spTree>
     <p:extLst>
       <p:ext uri="{BB962C8B-B14F-4D97-AF65-F5344CB8AC3E}">
-        <p14:creationId xmlns:p14="http://schemas.microsoft.com/office/powerpoint/2010/main" val="2649033550"/>
-      </p:ext>
-    </p:extLst>
-  </p:cSld>
-  <p:clrMapOvr>
-    <a:masterClrMapping/>
-  </p:clrMapOvr>
-</p:sld>
-</file>
-
-<file path=ppt/slides/slide6.xml><?xml version="1.0" encoding="utf-8"?>
-<p:sld xmlns:a="http://schemas.openxmlformats.org/drawingml/2006/main" xmlns:r="http://schemas.openxmlformats.org/officeDocument/2006/relationships" xmlns:p="http://schemas.openxmlformats.org/presentationml/2006/main">
-  <p:cSld>
-    <p:spTree>
-      <p:nvGrpSpPr>
-        <p:cNvPr id="1" name=""/>
-        <p:cNvGrpSpPr/>
-        <p:nvPr/>
-      </p:nvGrpSpPr>
-      <p:grpSpPr>
-        <a:xfrm>
-          <a:off x="0" y="0"/>
-          <a:ext cx="0" cy="0"/>
-          <a:chOff x="0" y="0"/>
-          <a:chExt cx="0" cy="0"/>
-        </a:xfrm>
-      </p:grpSpPr>
-      <p:sp>
-        <p:nvSpPr>
-          <p:cNvPr id="18" name="Down Arrow 17"/>
-          <p:cNvSpPr/>
-          <p:nvPr/>
-        </p:nvSpPr>
-        <p:spPr>
-          <a:xfrm rot="16200000">
-            <a:off x="2690380" y="3637629"/>
-            <a:ext cx="486640" cy="533400"/>
-          </a:xfrm>
-          <a:prstGeom prst="downArrow">
-            <a:avLst/>
-          </a:prstGeom>
-        </p:spPr>
-        <p:style>
-          <a:lnRef idx="2">
-            <a:schemeClr val="dk1">
-              <a:shade val="50000"/>
-            </a:schemeClr>
-          </a:lnRef>
-          <a:fillRef idx="1">
-            <a:schemeClr val="dk1"/>
-          </a:fillRef>
-          <a:effectRef idx="0">
-            <a:schemeClr val="dk1"/>
-          </a:effectRef>
-          <a:fontRef idx="minor">
-            <a:schemeClr val="lt1"/>
-          </a:fontRef>
-        </p:style>
-        <p:txBody>
-          <a:bodyPr rtlCol="0" anchor="ctr"/>
-          <a:lstStyle/>
-          <a:p>
-            <a:pPr algn="ctr"/>
-            <a:endParaRPr lang="en-US">
-              <a:solidFill>
-                <a:prstClr val="white"/>
-              </a:solidFill>
-            </a:endParaRPr>
-          </a:p>
-        </p:txBody>
-      </p:sp>
-      <p:sp>
-        <p:nvSpPr>
-          <p:cNvPr id="6" name="Rounded Rectangle 5"/>
-          <p:cNvSpPr/>
-          <p:nvPr/>
-        </p:nvSpPr>
-        <p:spPr>
-          <a:xfrm>
-            <a:off x="43621" y="3584001"/>
-            <a:ext cx="2547179" cy="683200"/>
-          </a:xfrm>
-          <a:prstGeom prst="roundRect">
-            <a:avLst/>
-          </a:prstGeom>
-        </p:spPr>
-        <p:style>
-          <a:lnRef idx="2">
-            <a:schemeClr val="accent1">
-              <a:shade val="50000"/>
-            </a:schemeClr>
-          </a:lnRef>
-          <a:fillRef idx="1">
-            <a:schemeClr val="accent1"/>
-          </a:fillRef>
-          <a:effectRef idx="0">
-            <a:schemeClr val="accent1"/>
-          </a:effectRef>
-          <a:fontRef idx="minor">
-            <a:schemeClr val="lt1"/>
-          </a:fontRef>
-        </p:style>
-        <p:txBody>
-          <a:bodyPr rtlCol="0" anchor="t" anchorCtr="0"/>
-          <a:lstStyle/>
-          <a:p>
-            <a:pPr algn="ctr"/>
-            <a:r>
-              <a:rPr lang="en-US" sz="1050" b="1" u="sng" dirty="0" smtClean="0">
-                <a:solidFill>
-                  <a:prstClr val="white"/>
-                </a:solidFill>
-              </a:rPr>
-              <a:t>Preprocess</a:t>
-            </a:r>
-          </a:p>
-          <a:p>
-            <a:r>
-              <a:rPr lang="en-US" sz="1050" dirty="0">
-                <a:solidFill>
-                  <a:prstClr val="white"/>
-                </a:solidFill>
-              </a:rPr>
-              <a:t>Uses feedback mechanisms to modify elements for the next time step</a:t>
-            </a:r>
-            <a:r>
-              <a:rPr lang="en-US" sz="1050" dirty="0" smtClean="0">
-                <a:solidFill>
-                  <a:prstClr val="white"/>
-                </a:solidFill>
-              </a:rPr>
-              <a:t>.</a:t>
-            </a:r>
-            <a:endParaRPr lang="en-US" sz="1050" dirty="0">
-              <a:solidFill>
-                <a:prstClr val="white"/>
-              </a:solidFill>
-            </a:endParaRPr>
-          </a:p>
-        </p:txBody>
-      </p:sp>
-      <p:sp>
-        <p:nvSpPr>
-          <p:cNvPr id="26" name="Rounded Rectangle 25"/>
-          <p:cNvSpPr/>
-          <p:nvPr/>
-        </p:nvSpPr>
-        <p:spPr>
-          <a:xfrm>
-            <a:off x="3304670" y="3584001"/>
-            <a:ext cx="2547179" cy="683200"/>
-          </a:xfrm>
-          <a:prstGeom prst="roundRect">
-            <a:avLst/>
-          </a:prstGeom>
-        </p:spPr>
-        <p:style>
-          <a:lnRef idx="2">
-            <a:schemeClr val="accent1">
-              <a:shade val="50000"/>
-            </a:schemeClr>
-          </a:lnRef>
-          <a:fillRef idx="1">
-            <a:schemeClr val="accent1"/>
-          </a:fillRef>
-          <a:effectRef idx="0">
-            <a:schemeClr val="accent1"/>
-          </a:effectRef>
-          <a:fontRef idx="minor">
-            <a:schemeClr val="lt1"/>
-          </a:fontRef>
-        </p:style>
-        <p:txBody>
-          <a:bodyPr rtlCol="0" anchor="t" anchorCtr="0"/>
-          <a:lstStyle/>
-          <a:p>
-            <a:pPr algn="ctr"/>
-            <a:r>
-              <a:rPr lang="en-US" sz="1050" b="1" u="sng" dirty="0" smtClean="0">
-                <a:solidFill>
-                  <a:prstClr val="white"/>
-                </a:solidFill>
-              </a:rPr>
-              <a:t>Process</a:t>
-            </a:r>
-          </a:p>
-          <a:p>
-            <a:r>
-              <a:rPr lang="en-US" sz="1050" dirty="0">
-                <a:solidFill>
-                  <a:prstClr val="white"/>
-                </a:solidFill>
-              </a:rPr>
-              <a:t>Calculates the entire state of the system for the next time step</a:t>
-            </a:r>
-            <a:r>
-              <a:rPr lang="en-US" sz="1050" dirty="0" smtClean="0">
-                <a:solidFill>
-                  <a:prstClr val="white"/>
-                </a:solidFill>
-              </a:rPr>
-              <a:t>.</a:t>
-            </a:r>
-            <a:endParaRPr lang="en-US" sz="1050" dirty="0">
-              <a:solidFill>
-                <a:prstClr val="white"/>
-              </a:solidFill>
-            </a:endParaRPr>
-          </a:p>
-        </p:txBody>
-      </p:sp>
-      <p:sp>
-        <p:nvSpPr>
-          <p:cNvPr id="27" name="Rounded Rectangle 26"/>
-          <p:cNvSpPr/>
-          <p:nvPr/>
-        </p:nvSpPr>
-        <p:spPr>
-          <a:xfrm>
-            <a:off x="6565719" y="3584001"/>
-            <a:ext cx="2547179" cy="683200"/>
-          </a:xfrm>
-          <a:prstGeom prst="roundRect">
-            <a:avLst/>
-          </a:prstGeom>
-        </p:spPr>
-        <p:style>
-          <a:lnRef idx="2">
-            <a:schemeClr val="accent1">
-              <a:shade val="50000"/>
-            </a:schemeClr>
-          </a:lnRef>
-          <a:fillRef idx="1">
-            <a:schemeClr val="accent1"/>
-          </a:fillRef>
-          <a:effectRef idx="0">
-            <a:schemeClr val="accent1"/>
-          </a:effectRef>
-          <a:fontRef idx="minor">
-            <a:schemeClr val="lt1"/>
-          </a:fontRef>
-        </p:style>
-        <p:txBody>
-          <a:bodyPr rtlCol="0" anchor="t" anchorCtr="0"/>
-          <a:lstStyle/>
-          <a:p>
-            <a:pPr algn="ctr"/>
-            <a:r>
-              <a:rPr lang="en-US" sz="1050" b="1" u="sng" dirty="0" err="1" smtClean="0">
-                <a:solidFill>
-                  <a:prstClr val="white"/>
-                </a:solidFill>
-              </a:rPr>
-              <a:t>PostProcess</a:t>
-            </a:r>
-            <a:endParaRPr lang="en-US" sz="1050" b="1" u="sng" dirty="0" smtClean="0">
-              <a:solidFill>
-                <a:prstClr val="white"/>
-              </a:solidFill>
-            </a:endParaRPr>
-          </a:p>
-          <a:p>
-            <a:r>
-              <a:rPr lang="en-US" sz="1050" dirty="0">
-                <a:solidFill>
-                  <a:prstClr val="white"/>
-                </a:solidFill>
-              </a:rPr>
-              <a:t>Advances time by moving the next time step to current</a:t>
-            </a:r>
-            <a:r>
-              <a:rPr lang="en-US" sz="1050" dirty="0" smtClean="0">
-                <a:solidFill>
-                  <a:prstClr val="white"/>
-                </a:solidFill>
-              </a:rPr>
-              <a:t>.</a:t>
-            </a:r>
-            <a:endParaRPr lang="en-US" sz="1050" dirty="0">
-              <a:solidFill>
-                <a:prstClr val="white"/>
-              </a:solidFill>
-            </a:endParaRPr>
-          </a:p>
-        </p:txBody>
-      </p:sp>
-      <p:sp>
-        <p:nvSpPr>
-          <p:cNvPr id="28" name="Rounded Rectangle 27"/>
-          <p:cNvSpPr/>
-          <p:nvPr/>
-        </p:nvSpPr>
-        <p:spPr>
-          <a:xfrm>
-            <a:off x="4419600" y="1736495"/>
-            <a:ext cx="2547179" cy="701905"/>
-          </a:xfrm>
-          <a:prstGeom prst="roundRect">
-            <a:avLst/>
-          </a:prstGeom>
-        </p:spPr>
-        <p:style>
-          <a:lnRef idx="2">
-            <a:schemeClr val="accent1">
-              <a:shade val="50000"/>
-            </a:schemeClr>
-          </a:lnRef>
-          <a:fillRef idx="1">
-            <a:schemeClr val="accent1"/>
-          </a:fillRef>
-          <a:effectRef idx="0">
-            <a:schemeClr val="accent1"/>
-          </a:effectRef>
-          <a:fontRef idx="minor">
-            <a:schemeClr val="lt1"/>
-          </a:fontRef>
-        </p:style>
-        <p:txBody>
-          <a:bodyPr rtlCol="0" anchor="t" anchorCtr="0"/>
-          <a:lstStyle/>
-          <a:p>
-            <a:pPr algn="ctr"/>
-            <a:r>
-              <a:rPr lang="en-US" sz="1050" b="1" u="sng" dirty="0" smtClean="0">
-                <a:solidFill>
-                  <a:prstClr val="white"/>
-                </a:solidFill>
-              </a:rPr>
-              <a:t>Assessments</a:t>
-            </a:r>
-          </a:p>
-          <a:p>
-            <a:r>
-              <a:rPr lang="en-US" sz="1050" dirty="0" smtClean="0">
-                <a:solidFill>
-                  <a:prstClr val="white"/>
-                </a:solidFill>
-              </a:rPr>
-              <a:t>Called on demand to calculate and set assessment specific data.</a:t>
-            </a:r>
-          </a:p>
-        </p:txBody>
-      </p:sp>
-      <p:sp>
-        <p:nvSpPr>
-          <p:cNvPr id="31" name="Rounded Rectangle 30"/>
-          <p:cNvSpPr/>
-          <p:nvPr/>
-        </p:nvSpPr>
-        <p:spPr>
-          <a:xfrm>
-            <a:off x="43620" y="480447"/>
-            <a:ext cx="2547179" cy="472033"/>
-          </a:xfrm>
-          <a:prstGeom prst="roundRect">
-            <a:avLst/>
-          </a:prstGeom>
-        </p:spPr>
-        <p:style>
-          <a:lnRef idx="2">
-            <a:schemeClr val="accent1">
-              <a:shade val="50000"/>
-            </a:schemeClr>
-          </a:lnRef>
-          <a:fillRef idx="1">
-            <a:schemeClr val="accent1"/>
-          </a:fillRef>
-          <a:effectRef idx="0">
-            <a:schemeClr val="accent1"/>
-          </a:effectRef>
-          <a:fontRef idx="minor">
-            <a:schemeClr val="lt1"/>
-          </a:fontRef>
-        </p:style>
-        <p:txBody>
-          <a:bodyPr rtlCol="0" anchor="t" anchorCtr="0"/>
-          <a:lstStyle/>
-          <a:p>
-            <a:pPr algn="ctr"/>
-            <a:r>
-              <a:rPr lang="en-US" sz="1050" b="1" u="sng" dirty="0" smtClean="0">
-                <a:solidFill>
-                  <a:prstClr val="white"/>
-                </a:solidFill>
-              </a:rPr>
-              <a:t>Reset</a:t>
-            </a:r>
-          </a:p>
-          <a:p>
-            <a:r>
-              <a:rPr lang="en-US" sz="1050" dirty="0" smtClean="0">
-                <a:solidFill>
-                  <a:prstClr val="white"/>
-                </a:solidFill>
-              </a:rPr>
-              <a:t>Initializes the system.</a:t>
-            </a:r>
-          </a:p>
-        </p:txBody>
-      </p:sp>
-      <p:sp>
-        <p:nvSpPr>
-          <p:cNvPr id="33" name="Rounded Rectangle 32"/>
-          <p:cNvSpPr/>
-          <p:nvPr/>
-        </p:nvSpPr>
-        <p:spPr>
-          <a:xfrm>
-            <a:off x="43621" y="1658724"/>
-            <a:ext cx="2524974" cy="1198756"/>
-          </a:xfrm>
-          <a:prstGeom prst="roundRect">
-            <a:avLst/>
-          </a:prstGeom>
-        </p:spPr>
-        <p:style>
-          <a:lnRef idx="2">
-            <a:schemeClr val="accent1">
-              <a:shade val="50000"/>
-            </a:schemeClr>
-          </a:lnRef>
-          <a:fillRef idx="1">
-            <a:schemeClr val="accent1"/>
-          </a:fillRef>
-          <a:effectRef idx="0">
-            <a:schemeClr val="accent1"/>
-          </a:effectRef>
-          <a:fontRef idx="minor">
-            <a:schemeClr val="lt1"/>
-          </a:fontRef>
-        </p:style>
-        <p:txBody>
-          <a:bodyPr rtlCol="0" anchor="t" anchorCtr="0"/>
-          <a:lstStyle/>
-          <a:p>
-            <a:pPr algn="ctr"/>
-            <a:r>
-              <a:rPr lang="en-US" sz="1050" b="1" u="sng" dirty="0" smtClean="0">
-                <a:solidFill>
-                  <a:prstClr val="white"/>
-                </a:solidFill>
-              </a:rPr>
-              <a:t>Initialization</a:t>
-            </a:r>
-          </a:p>
-          <a:p>
-            <a:r>
-              <a:rPr lang="en-US" sz="1050" b="1" dirty="0" smtClean="0"/>
-              <a:t>Resting</a:t>
-            </a:r>
-            <a:r>
-              <a:rPr lang="en-US" sz="1050" dirty="0" smtClean="0"/>
-              <a:t>: Functionality specific to resting patient stabilization</a:t>
-            </a:r>
-          </a:p>
-          <a:p>
-            <a:endParaRPr lang="en-US" sz="1050" dirty="0" smtClean="0"/>
-          </a:p>
-          <a:p>
-            <a:r>
-              <a:rPr lang="en-US" sz="1050" b="1" dirty="0" smtClean="0">
-                <a:solidFill>
-                  <a:prstClr val="white"/>
-                </a:solidFill>
-              </a:rPr>
-              <a:t>Conditions</a:t>
-            </a:r>
-            <a:r>
-              <a:rPr lang="en-US" sz="1050" dirty="0" smtClean="0">
-                <a:solidFill>
-                  <a:prstClr val="white"/>
-                </a:solidFill>
-              </a:rPr>
-              <a:t>: Functionality specific to applying conditions</a:t>
-            </a:r>
-            <a:endParaRPr lang="en-US" sz="1050" dirty="0">
-              <a:solidFill>
-                <a:prstClr val="white"/>
-              </a:solidFill>
-            </a:endParaRPr>
-          </a:p>
-        </p:txBody>
-      </p:sp>
-      <p:sp>
-        <p:nvSpPr>
-          <p:cNvPr id="34" name="Down Arrow 33"/>
-          <p:cNvSpPr/>
-          <p:nvPr/>
-        </p:nvSpPr>
-        <p:spPr>
-          <a:xfrm rot="16200000">
-            <a:off x="5966980" y="3637630"/>
-            <a:ext cx="486640" cy="533400"/>
-          </a:xfrm>
-          <a:prstGeom prst="downArrow">
-            <a:avLst/>
-          </a:prstGeom>
-        </p:spPr>
-        <p:style>
-          <a:lnRef idx="2">
-            <a:schemeClr val="dk1">
-              <a:shade val="50000"/>
-            </a:schemeClr>
-          </a:lnRef>
-          <a:fillRef idx="1">
-            <a:schemeClr val="dk1"/>
-          </a:fillRef>
-          <a:effectRef idx="0">
-            <a:schemeClr val="dk1"/>
-          </a:effectRef>
-          <a:fontRef idx="minor">
-            <a:schemeClr val="lt1"/>
-          </a:fontRef>
-        </p:style>
-        <p:txBody>
-          <a:bodyPr rtlCol="0" anchor="ctr"/>
-          <a:lstStyle/>
-          <a:p>
-            <a:pPr algn="ctr"/>
-            <a:endParaRPr lang="en-US">
-              <a:solidFill>
-                <a:prstClr val="white"/>
-              </a:solidFill>
-            </a:endParaRPr>
-          </a:p>
-        </p:txBody>
-      </p:sp>
-      <p:sp>
-        <p:nvSpPr>
-          <p:cNvPr id="35" name="Down Arrow 34"/>
-          <p:cNvSpPr/>
-          <p:nvPr/>
-        </p:nvSpPr>
-        <p:spPr>
-          <a:xfrm>
-            <a:off x="1062788" y="2960137"/>
-            <a:ext cx="486640" cy="533400"/>
-          </a:xfrm>
-          <a:prstGeom prst="downArrow">
-            <a:avLst/>
-          </a:prstGeom>
-        </p:spPr>
-        <p:style>
-          <a:lnRef idx="2">
-            <a:schemeClr val="dk1">
-              <a:shade val="50000"/>
-            </a:schemeClr>
-          </a:lnRef>
-          <a:fillRef idx="1">
-            <a:schemeClr val="dk1"/>
-          </a:fillRef>
-          <a:effectRef idx="0">
-            <a:schemeClr val="dk1"/>
-          </a:effectRef>
-          <a:fontRef idx="minor">
-            <a:schemeClr val="lt1"/>
-          </a:fontRef>
-        </p:style>
-        <p:txBody>
-          <a:bodyPr rtlCol="0" anchor="ctr"/>
-          <a:lstStyle/>
-          <a:p>
-            <a:pPr algn="ctr"/>
-            <a:endParaRPr lang="en-US">
-              <a:solidFill>
-                <a:prstClr val="white"/>
-              </a:solidFill>
-            </a:endParaRPr>
-          </a:p>
-        </p:txBody>
-      </p:sp>
-      <p:sp>
-        <p:nvSpPr>
-          <p:cNvPr id="36" name="Down Arrow 35"/>
-          <p:cNvSpPr/>
-          <p:nvPr/>
-        </p:nvSpPr>
-        <p:spPr>
-          <a:xfrm>
-            <a:off x="1062788" y="1028680"/>
-            <a:ext cx="486640" cy="533400"/>
-          </a:xfrm>
-          <a:prstGeom prst="downArrow">
-            <a:avLst/>
-          </a:prstGeom>
-        </p:spPr>
-        <p:style>
-          <a:lnRef idx="2">
-            <a:schemeClr val="dk1">
-              <a:shade val="50000"/>
-            </a:schemeClr>
-          </a:lnRef>
-          <a:fillRef idx="1">
-            <a:schemeClr val="dk1"/>
-          </a:fillRef>
-          <a:effectRef idx="0">
-            <a:schemeClr val="dk1"/>
-          </a:effectRef>
-          <a:fontRef idx="minor">
-            <a:schemeClr val="lt1"/>
-          </a:fontRef>
-        </p:style>
-        <p:txBody>
-          <a:bodyPr rtlCol="0" anchor="ctr"/>
-          <a:lstStyle/>
-          <a:p>
-            <a:pPr algn="ctr"/>
-            <a:endParaRPr lang="en-US">
-              <a:solidFill>
-                <a:prstClr val="white"/>
-              </a:solidFill>
-            </a:endParaRPr>
-          </a:p>
-        </p:txBody>
-      </p:sp>
-      <p:sp>
-        <p:nvSpPr>
-          <p:cNvPr id="2" name="U-Turn Arrow 1"/>
-          <p:cNvSpPr/>
-          <p:nvPr/>
-        </p:nvSpPr>
-        <p:spPr>
-          <a:xfrm rot="10800000">
-            <a:off x="1056329" y="4343400"/>
-            <a:ext cx="6938212" cy="1066800"/>
-          </a:xfrm>
-          <a:prstGeom prst="uturnArrow">
-            <a:avLst/>
-          </a:prstGeom>
-        </p:spPr>
-        <p:style>
-          <a:lnRef idx="2">
-            <a:schemeClr val="dk1">
-              <a:shade val="50000"/>
-            </a:schemeClr>
-          </a:lnRef>
-          <a:fillRef idx="1">
-            <a:schemeClr val="dk1"/>
-          </a:fillRef>
-          <a:effectRef idx="0">
-            <a:schemeClr val="dk1"/>
-          </a:effectRef>
-          <a:fontRef idx="minor">
-            <a:schemeClr val="lt1"/>
-          </a:fontRef>
-        </p:style>
-        <p:txBody>
-          <a:bodyPr rtlCol="0" anchor="ctr"/>
-          <a:lstStyle/>
-          <a:p>
-            <a:pPr algn="ctr"/>
-            <a:endParaRPr lang="en-US">
-              <a:solidFill>
-                <a:prstClr val="white"/>
-              </a:solidFill>
-            </a:endParaRPr>
-          </a:p>
-        </p:txBody>
-      </p:sp>
-      <p:pic>
-        <p:nvPicPr>
-          <p:cNvPr id="6146" name="Picture 2"/>
-          <p:cNvPicPr>
-            <a:picLocks noChangeAspect="1" noChangeArrowheads="1"/>
-          </p:cNvPicPr>
-          <p:nvPr/>
-        </p:nvPicPr>
-        <p:blipFill>
-          <a:blip r:embed="rId2" cstate="print">
-            <a:extLst>
-              <a:ext uri="{28A0092B-C50C-407E-A947-70E740481C1C}">
-                <a14:useLocalDpi xmlns:a14="http://schemas.microsoft.com/office/drawing/2010/main" val="0"/>
-              </a:ext>
-            </a:extLst>
-          </a:blip>
-          <a:srcRect/>
-          <a:stretch>
-            <a:fillRect/>
-          </a:stretch>
-        </p:blipFill>
-        <p:spPr bwMode="auto">
-          <a:xfrm>
-            <a:off x="3509046" y="3584001"/>
-            <a:ext cx="5544586" cy="3020977"/>
-          </a:xfrm>
-          <a:prstGeom prst="rect">
-            <a:avLst/>
-          </a:prstGeom>
-          <a:noFill/>
-          <a:ln>
-            <a:noFill/>
-          </a:ln>
-          <a:effectLst/>
-          <a:extLst>
-            <a:ext uri="{909E8E84-426E-40DD-AFC4-6F175D3DCCD1}">
-              <a14:hiddenFill xmlns:a14="http://schemas.microsoft.com/office/drawing/2010/main">
-                <a:solidFill>
-                  <a:schemeClr val="accent1"/>
-                </a:solidFill>
-              </a14:hiddenFill>
-            </a:ext>
-            <a:ext uri="{91240B29-F687-4F45-9708-019B960494DF}">
-              <a14:hiddenLine xmlns:a14="http://schemas.microsoft.com/office/drawing/2010/main" w="9525">
-                <a:solidFill>
-                  <a:schemeClr val="tx1"/>
-                </a:solidFill>
-                <a:miter lim="800000"/>
-                <a:headEnd/>
-                <a:tailEnd/>
-              </a14:hiddenLine>
-            </a:ext>
-            <a:ext uri="{AF507438-7753-43E0-B8FC-AC1667EBCBE1}">
-              <a14:hiddenEffects xmlns:a14="http://schemas.microsoft.com/office/drawing/2010/main">
-                <a:effectLst>
-                  <a:outerShdw dist="35921" dir="2700000" algn="ctr" rotWithShape="0">
-                    <a:schemeClr val="bg2"/>
-                  </a:outerShdw>
-                </a:effectLst>
-              </a14:hiddenEffects>
-            </a:ext>
-          </a:extLst>
-        </p:spPr>
-      </p:pic>
-    </p:spTree>
-    <p:extLst>
-      <p:ext uri="{BB962C8B-B14F-4D97-AF65-F5344CB8AC3E}">
         <p14:creationId xmlns:p14="http://schemas.microsoft.com/office/powerpoint/2010/main" val="329163800"/>
       </p:ext>
     </p:extLst>
@@ -14337,13 +13943,6 @@
   <p:clrMapOvr>
     <a:masterClrMapping/>
   </p:clrMapOvr>
-  <p:timing>
-    <p:tnLst>
-      <p:par>
-        <p:cTn id="1" dur="indefinite" restart="never" nodeType="tmRoot"/>
-      </p:par>
-    </p:tnLst>
-  </p:timing>
 </p:sld>
 </file>
 

</xml_diff>